<commit_message>
ajout test estgagnant estTermine
</commit_message>
<xml_diff>
--- a/Soutenance.pptx
+++ b/Soutenance.pptx
@@ -8,6 +8,8 @@
     <p:sldId id="256" r:id="rId2"/>
     <p:sldId id="257" r:id="rId3"/>
     <p:sldId id="258" r:id="rId4"/>
+    <p:sldId id="259" r:id="rId5"/>
+    <p:sldId id="260" r:id="rId6"/>
   </p:sldIdLst>
   <p:sldSz cx="12192000" cy="6858000"/>
   <p:notesSz cx="6858000" cy="9144000"/>
@@ -5508,61 +5510,6 @@
             </a:r>
           </a:p>
           <a:p>
-            <a:r>
-              <a:rPr lang="fr-FR" dirty="0"/>
-              <a:t>L’implantation respecte la structure donnée (avec quelques légères modifications)</a:t>
-            </a:r>
-          </a:p>
-          <a:p>
-            <a:pPr lvl="1"/>
-            <a:r>
-              <a:rPr lang="fr-FR" dirty="0"/>
-              <a:t>Rajout des fonctions:</a:t>
-            </a:r>
-          </a:p>
-          <a:p>
-            <a:pPr lvl="3"/>
-            <a:r>
-              <a:rPr lang="fr-FR" dirty="0"/>
-              <a:t>deplacementGauche_sansCombi</a:t>
-            </a:r>
-          </a:p>
-          <a:p>
-            <a:pPr lvl="3"/>
-            <a:r>
-              <a:rPr lang="fr-FR" dirty="0"/>
-              <a:t>deplacementHaut_sansCombi</a:t>
-            </a:r>
-          </a:p>
-          <a:p>
-            <a:pPr lvl="3"/>
-            <a:r>
-              <a:rPr lang="fr-FR" dirty="0"/>
-              <a:t>combineCases_gauche</a:t>
-            </a:r>
-          </a:p>
-          <a:p>
-            <a:pPr lvl="3"/>
-            <a:r>
-              <a:rPr lang="fr-FR" dirty="0"/>
-              <a:t>combineCases_haut</a:t>
-            </a:r>
-          </a:p>
-          <a:p>
-            <a:pPr lvl="3"/>
-            <a:r>
-              <a:rPr lang="fr-FR" dirty="0"/>
-              <a:t>flip_horizontal</a:t>
-            </a:r>
-          </a:p>
-          <a:p>
-            <a:pPr lvl="3"/>
-            <a:r>
-              <a:rPr lang="fr-FR" dirty="0"/>
-              <a:t>flip_vertical </a:t>
-            </a:r>
-          </a:p>
-          <a:p>
             <a:pPr marL="1371600" lvl="3" indent="0">
               <a:buNone/>
             </a:pPr>
@@ -5646,8 +5593,65 @@
         </p:nvSpPr>
         <p:spPr/>
         <p:txBody>
-          <a:bodyPr/>
-          <a:lstStyle/>
+          <a:bodyPr>
+            <a:normAutofit/>
+          </a:bodyPr>
+          <a:lstStyle/>
+          <a:p>
+            <a:r>
+              <a:rPr lang="fr-FR" dirty="0"/>
+              <a:t>L’implantation respecte la structure donnée (avec quelques légères modifications)</a:t>
+            </a:r>
+          </a:p>
+          <a:p>
+            <a:pPr lvl="1"/>
+            <a:r>
+              <a:rPr lang="fr-FR" dirty="0"/>
+              <a:t>Rajout des fonctions:</a:t>
+            </a:r>
+          </a:p>
+          <a:p>
+            <a:pPr lvl="3"/>
+            <a:r>
+              <a:rPr lang="fr-FR" dirty="0"/>
+              <a:t>deplacementGauche_sansCombi</a:t>
+            </a:r>
+          </a:p>
+          <a:p>
+            <a:pPr lvl="3"/>
+            <a:r>
+              <a:rPr lang="fr-FR" dirty="0"/>
+              <a:t>deplacementHaut_sansCombi</a:t>
+            </a:r>
+          </a:p>
+          <a:p>
+            <a:pPr lvl="3"/>
+            <a:r>
+              <a:rPr lang="fr-FR" dirty="0"/>
+              <a:t>combineCases_gauche</a:t>
+            </a:r>
+          </a:p>
+          <a:p>
+            <a:pPr lvl="3"/>
+            <a:r>
+              <a:rPr lang="fr-FR" dirty="0"/>
+              <a:t>combineCases_haut</a:t>
+            </a:r>
+          </a:p>
+          <a:p>
+            <a:pPr lvl="3"/>
+            <a:r>
+              <a:rPr lang="fr-FR" dirty="0"/>
+              <a:t>flip_horizontal</a:t>
+            </a:r>
+          </a:p>
+          <a:p>
+            <a:pPr lvl="3"/>
+            <a:r>
+              <a:rPr lang="fr-FR" dirty="0"/>
+              <a:t>flip_vertical </a:t>
+            </a:r>
+          </a:p>
           <a:p>
             <a:r>
               <a:rPr lang="fr-FR" dirty="0"/>
@@ -5655,18 +5659,10 @@
             </a:r>
           </a:p>
           <a:p>
-            <a:endParaRPr lang="fr-FR" dirty="0"/>
-          </a:p>
-          <a:p>
             <a:r>
               <a:rPr lang="fr-FR" dirty="0"/>
-              <a:t>On dispose d’un bon affichage </a:t>
-            </a:r>
-            <a:r>
-              <a:rPr lang="fr-FR"/>
-              <a:t>du plateau de jeu.</a:t>
-            </a:r>
-            <a:endParaRPr lang="fr-FR" dirty="0"/>
+              <a:t>On dispose d’un bon affichage du plateau de jeu</a:t>
+            </a:r>
           </a:p>
         </p:txBody>
       </p:sp>
@@ -5674,6 +5670,194 @@
     <p:extLst>
       <p:ext uri="{BB962C8B-B14F-4D97-AF65-F5344CB8AC3E}">
         <p14:creationId xmlns:p14="http://schemas.microsoft.com/office/powerpoint/2010/main" val="3478660271"/>
+      </p:ext>
+    </p:extLst>
+  </p:cSld>
+  <p:clrMapOvr>
+    <a:masterClrMapping/>
+  </p:clrMapOvr>
+</p:sld>
+</file>
+
+<file path=ppt/slides/slide4.xml><?xml version="1.0" encoding="utf-8"?>
+<p:sld xmlns:a="http://schemas.openxmlformats.org/drawingml/2006/main" xmlns:r="http://schemas.openxmlformats.org/officeDocument/2006/relationships" xmlns:p="http://schemas.openxmlformats.org/presentationml/2006/main">
+  <p:cSld>
+    <p:spTree>
+      <p:nvGrpSpPr>
+        <p:cNvPr id="1" name=""/>
+        <p:cNvGrpSpPr/>
+        <p:nvPr/>
+      </p:nvGrpSpPr>
+      <p:grpSpPr>
+        <a:xfrm>
+          <a:off x="0" y="0"/>
+          <a:ext cx="0" cy="0"/>
+          <a:chOff x="0" y="0"/>
+          <a:chExt cx="0" cy="0"/>
+        </a:xfrm>
+      </p:grpSpPr>
+      <p:sp>
+        <p:nvSpPr>
+          <p:cNvPr id="2" name="Title 1">
+            <a:extLst>
+              <a:ext uri="{FF2B5EF4-FFF2-40B4-BE49-F238E27FC236}">
+                <a16:creationId xmlns:a16="http://schemas.microsoft.com/office/drawing/2014/main" id="{1E5A8199-6959-CA42-B906-2ED572DC8CBB}"/>
+              </a:ext>
+            </a:extLst>
+          </p:cNvPr>
+          <p:cNvSpPr>
+            <a:spLocks noGrp="1"/>
+          </p:cNvSpPr>
+          <p:nvPr>
+            <p:ph type="ctrTitle"/>
+          </p:nvPr>
+        </p:nvSpPr>
+        <p:spPr/>
+        <p:txBody>
+          <a:bodyPr/>
+          <a:lstStyle/>
+          <a:p>
+            <a:r>
+              <a:rPr lang="fr-FR" dirty="0"/>
+              <a:t>Niveau 1</a:t>
+            </a:r>
+          </a:p>
+        </p:txBody>
+      </p:sp>
+    </p:spTree>
+    <p:extLst>
+      <p:ext uri="{BB962C8B-B14F-4D97-AF65-F5344CB8AC3E}">
+        <p14:creationId xmlns:p14="http://schemas.microsoft.com/office/powerpoint/2010/main" val="3853121290"/>
+      </p:ext>
+    </p:extLst>
+  </p:cSld>
+  <p:clrMapOvr>
+    <a:masterClrMapping/>
+  </p:clrMapOvr>
+</p:sld>
+</file>
+
+<file path=ppt/slides/slide5.xml><?xml version="1.0" encoding="utf-8"?>
+<p:sld xmlns:a="http://schemas.openxmlformats.org/drawingml/2006/main" xmlns:r="http://schemas.openxmlformats.org/officeDocument/2006/relationships" xmlns:p="http://schemas.openxmlformats.org/presentationml/2006/main">
+  <p:cSld>
+    <p:spTree>
+      <p:nvGrpSpPr>
+        <p:cNvPr id="1" name=""/>
+        <p:cNvGrpSpPr/>
+        <p:nvPr/>
+      </p:nvGrpSpPr>
+      <p:grpSpPr>
+        <a:xfrm>
+          <a:off x="0" y="0"/>
+          <a:ext cx="0" cy="0"/>
+          <a:chOff x="0" y="0"/>
+          <a:chExt cx="0" cy="0"/>
+        </a:xfrm>
+      </p:grpSpPr>
+      <p:sp>
+        <p:nvSpPr>
+          <p:cNvPr id="2" name="Title 1">
+            <a:extLst>
+              <a:ext uri="{FF2B5EF4-FFF2-40B4-BE49-F238E27FC236}">
+                <a16:creationId xmlns:a16="http://schemas.microsoft.com/office/drawing/2014/main" id="{84574A78-8DD4-4A4A-8CEA-AC048042931B}"/>
+              </a:ext>
+            </a:extLst>
+          </p:cNvPr>
+          <p:cNvSpPr>
+            <a:spLocks noGrp="1"/>
+          </p:cNvSpPr>
+          <p:nvPr>
+            <p:ph type="title"/>
+          </p:nvPr>
+        </p:nvSpPr>
+        <p:spPr/>
+        <p:txBody>
+          <a:bodyPr/>
+          <a:lstStyle/>
+          <a:p>
+            <a:r>
+              <a:rPr lang="fr-FR" dirty="0"/>
+              <a:t>1.1 utilisation de la bibliothèque </a:t>
+            </a:r>
+            <a:r>
+              <a:rPr lang="fr-FR" dirty="0" err="1"/>
+              <a:t>ncurse</a:t>
+            </a:r>
+            <a:r>
+              <a:rPr lang="fr-FR" dirty="0"/>
+              <a:t>:</a:t>
+            </a:r>
+          </a:p>
+        </p:txBody>
+      </p:sp>
+      <p:sp>
+        <p:nvSpPr>
+          <p:cNvPr id="3" name="Content Placeholder 2">
+            <a:extLst>
+              <a:ext uri="{FF2B5EF4-FFF2-40B4-BE49-F238E27FC236}">
+                <a16:creationId xmlns:a16="http://schemas.microsoft.com/office/drawing/2014/main" id="{6B79532C-9214-9C42-8BFF-F42C717DF159}"/>
+              </a:ext>
+            </a:extLst>
+          </p:cNvPr>
+          <p:cNvSpPr>
+            <a:spLocks noGrp="1"/>
+          </p:cNvSpPr>
+          <p:nvPr>
+            <p:ph sz="half" idx="1"/>
+          </p:nvPr>
+        </p:nvSpPr>
+        <p:spPr/>
+        <p:txBody>
+          <a:bodyPr/>
+          <a:lstStyle/>
+          <a:p>
+            <a:r>
+              <a:rPr lang="fr-FR" dirty="0"/>
+              <a:t>Couleur jaune globale du plateau de jeu et le score.</a:t>
+            </a:r>
+          </a:p>
+          <a:p>
+            <a:r>
+              <a:rPr lang="fr-FR" dirty="0"/>
+              <a:t>Couleur blanche sur fond </a:t>
+            </a:r>
+            <a:r>
+              <a:rPr lang="fr-FR"/>
+              <a:t>rouge pour le texte de fin de jeu</a:t>
+            </a:r>
+            <a:endParaRPr lang="fr-FR" dirty="0"/>
+          </a:p>
+        </p:txBody>
+      </p:sp>
+      <p:sp>
+        <p:nvSpPr>
+          <p:cNvPr id="4" name="Content Placeholder 3">
+            <a:extLst>
+              <a:ext uri="{FF2B5EF4-FFF2-40B4-BE49-F238E27FC236}">
+                <a16:creationId xmlns:a16="http://schemas.microsoft.com/office/drawing/2014/main" id="{1E9AF836-7EB4-4B4D-9178-6D99AB1A745F}"/>
+              </a:ext>
+            </a:extLst>
+          </p:cNvPr>
+          <p:cNvSpPr>
+            <a:spLocks noGrp="1"/>
+          </p:cNvSpPr>
+          <p:nvPr>
+            <p:ph sz="half" idx="2"/>
+          </p:nvPr>
+        </p:nvSpPr>
+        <p:spPr/>
+        <p:txBody>
+          <a:bodyPr/>
+          <a:lstStyle/>
+          <a:p>
+            <a:endParaRPr lang="fr-FR"/>
+          </a:p>
+        </p:txBody>
+      </p:sp>
+    </p:spTree>
+    <p:extLst>
+      <p:ext uri="{BB962C8B-B14F-4D97-AF65-F5344CB8AC3E}">
+        <p14:creationId xmlns:p14="http://schemas.microsoft.com/office/powerpoint/2010/main" val="3528297022"/>
       </p:ext>
     </p:extLst>
   </p:cSld>

</xml_diff>

<commit_message>
finition powerp, rapport, tests
</commit_message>
<xml_diff>
--- a/Soutenance.pptx
+++ b/Soutenance.pptx
@@ -8,15 +8,16 @@
     <p:sldId id="256" r:id="rId2"/>
     <p:sldId id="257" r:id="rId3"/>
     <p:sldId id="258" r:id="rId4"/>
-    <p:sldId id="259" r:id="rId5"/>
-    <p:sldId id="260" r:id="rId6"/>
-    <p:sldId id="262" r:id="rId7"/>
-    <p:sldId id="261" r:id="rId8"/>
-    <p:sldId id="263" r:id="rId9"/>
-    <p:sldId id="264" r:id="rId10"/>
-    <p:sldId id="265" r:id="rId11"/>
-    <p:sldId id="266" r:id="rId12"/>
-    <p:sldId id="267" r:id="rId13"/>
+    <p:sldId id="268" r:id="rId5"/>
+    <p:sldId id="259" r:id="rId6"/>
+    <p:sldId id="260" r:id="rId7"/>
+    <p:sldId id="262" r:id="rId8"/>
+    <p:sldId id="261" r:id="rId9"/>
+    <p:sldId id="263" r:id="rId10"/>
+    <p:sldId id="264" r:id="rId11"/>
+    <p:sldId id="265" r:id="rId12"/>
+    <p:sldId id="266" r:id="rId13"/>
+    <p:sldId id="267" r:id="rId14"/>
   </p:sldIdLst>
   <p:sldSz cx="12192000" cy="6858000"/>
   <p:notesSz cx="6858000" cy="9144000"/>
@@ -8323,6 +8324,64 @@
 <file path=ppt/slides/slide10.xml><?xml version="1.0" encoding="utf-8"?>
 <p:sld xmlns:a="http://schemas.openxmlformats.org/drawingml/2006/main" xmlns:r="http://schemas.openxmlformats.org/officeDocument/2006/relationships" xmlns:p="http://schemas.openxmlformats.org/presentationml/2006/main">
   <p:cSld>
+    <p:spTree>
+      <p:nvGrpSpPr>
+        <p:cNvPr id="1" name=""/>
+        <p:cNvGrpSpPr/>
+        <p:nvPr/>
+      </p:nvGrpSpPr>
+      <p:grpSpPr>
+        <a:xfrm>
+          <a:off x="0" y="0"/>
+          <a:ext cx="0" cy="0"/>
+          <a:chOff x="0" y="0"/>
+          <a:chExt cx="0" cy="0"/>
+        </a:xfrm>
+      </p:grpSpPr>
+      <p:sp>
+        <p:nvSpPr>
+          <p:cNvPr id="2" name="Title 1">
+            <a:extLst>
+              <a:ext uri="{FF2B5EF4-FFF2-40B4-BE49-F238E27FC236}">
+                <a16:creationId xmlns:a16="http://schemas.microsoft.com/office/drawing/2014/main" id="{3335E8FC-169E-F64C-A0CB-B0A7A087A39F}"/>
+              </a:ext>
+            </a:extLst>
+          </p:cNvPr>
+          <p:cNvSpPr>
+            <a:spLocks noGrp="1"/>
+          </p:cNvSpPr>
+          <p:nvPr>
+            <p:ph type="ctrTitle"/>
+          </p:nvPr>
+        </p:nvSpPr>
+        <p:spPr/>
+        <p:txBody>
+          <a:bodyPr/>
+          <a:lstStyle/>
+          <a:p>
+            <a:r>
+              <a:rPr lang="fr-FR" dirty="0"/>
+              <a:t>Niveau 2</a:t>
+            </a:r>
+          </a:p>
+        </p:txBody>
+      </p:sp>
+    </p:spTree>
+    <p:extLst>
+      <p:ext uri="{BB962C8B-B14F-4D97-AF65-F5344CB8AC3E}">
+        <p14:creationId xmlns:p14="http://schemas.microsoft.com/office/powerpoint/2010/main" val="1705030933"/>
+      </p:ext>
+    </p:extLst>
+  </p:cSld>
+  <p:clrMapOvr>
+    <a:masterClrMapping/>
+  </p:clrMapOvr>
+</p:sld>
+</file>
+
+<file path=ppt/slides/slide11.xml><?xml version="1.0" encoding="utf-8"?>
+<p:sld xmlns:a="http://schemas.openxmlformats.org/drawingml/2006/main" xmlns:r="http://schemas.openxmlformats.org/officeDocument/2006/relationships" xmlns:p="http://schemas.openxmlformats.org/presentationml/2006/main">
+  <p:cSld>
     <p:bg>
       <p:bgPr>
         <a:solidFill>
@@ -8952,7 +9011,7 @@
 </p:sld>
 </file>
 
-<file path=ppt/slides/slide11.xml><?xml version="1.0" encoding="utf-8"?>
+<file path=ppt/slides/slide12.xml><?xml version="1.0" encoding="utf-8"?>
 <p:sld xmlns:a="http://schemas.openxmlformats.org/drawingml/2006/main" xmlns:r="http://schemas.openxmlformats.org/officeDocument/2006/relationships" xmlns:p="http://schemas.openxmlformats.org/presentationml/2006/main">
   <p:cSld>
     <p:bg>
@@ -9604,7 +9663,7 @@
 </p:sld>
 </file>
 
-<file path=ppt/slides/slide12.xml><?xml version="1.0" encoding="utf-8"?>
+<file path=ppt/slides/slide13.xml><?xml version="1.0" encoding="utf-8"?>
 <p:sld xmlns:a="http://schemas.openxmlformats.org/drawingml/2006/main" xmlns:r="http://schemas.openxmlformats.org/officeDocument/2006/relationships" xmlns:p="http://schemas.openxmlformats.org/presentationml/2006/main">
   <p:cSld>
     <p:bg>
@@ -10838,13 +10897,13 @@
         <p:spPr>
           <a:xfrm>
             <a:off x="6008068" y="978993"/>
-            <a:ext cx="5365218" cy="4900014"/>
+            <a:ext cx="5625132" cy="4900014"/>
           </a:xfrm>
           <a:effectLst/>
         </p:spPr>
         <p:txBody>
           <a:bodyPr>
-            <a:normAutofit fontScale="92500" lnSpcReduction="20000"/>
+            <a:normAutofit/>
           </a:bodyPr>
           <a:lstStyle/>
           <a:p>
@@ -10854,7 +10913,7 @@
               </a:lnSpc>
             </a:pPr>
             <a:r>
-              <a:rPr lang="fr-FR" sz="1700"/>
+              <a:rPr lang="fr-FR" sz="1700" dirty="0"/>
               <a:t>L’implantation respecte la structure donnée (avec quelques légères modifications)</a:t>
             </a:r>
           </a:p>
@@ -10865,7 +10924,7 @@
               </a:lnSpc>
             </a:pPr>
             <a:r>
-              <a:rPr lang="fr-FR" sz="1700"/>
+              <a:rPr lang="fr-FR" sz="1700" dirty="0"/>
               <a:t>Rajout des fonctions:</a:t>
             </a:r>
           </a:p>
@@ -10876,7 +10935,7 @@
               </a:lnSpc>
             </a:pPr>
             <a:r>
-              <a:rPr lang="fr-FR" sz="1700"/>
+              <a:rPr lang="fr-FR" sz="1700" dirty="0"/>
               <a:t>deplacementGauche_sansCombi</a:t>
             </a:r>
           </a:p>
@@ -10887,7 +10946,7 @@
               </a:lnSpc>
             </a:pPr>
             <a:r>
-              <a:rPr lang="fr-FR" sz="1700"/>
+              <a:rPr lang="fr-FR" sz="1700" dirty="0"/>
               <a:t>deplacementHaut_sansCombi</a:t>
             </a:r>
           </a:p>
@@ -10898,7 +10957,7 @@
               </a:lnSpc>
             </a:pPr>
             <a:r>
-              <a:rPr lang="fr-FR" sz="1700"/>
+              <a:rPr lang="fr-FR" sz="1700" dirty="0"/>
               <a:t>combineCases_gauche</a:t>
             </a:r>
           </a:p>
@@ -10909,7 +10968,7 @@
               </a:lnSpc>
             </a:pPr>
             <a:r>
-              <a:rPr lang="fr-FR" sz="1700"/>
+              <a:rPr lang="fr-FR" sz="1700" dirty="0"/>
               <a:t>combineCases_haut</a:t>
             </a:r>
           </a:p>
@@ -10920,7 +10979,7 @@
               </a:lnSpc>
             </a:pPr>
             <a:r>
-              <a:rPr lang="fr-FR" sz="1700"/>
+              <a:rPr lang="fr-FR" sz="1700" dirty="0"/>
               <a:t>flip_horizontal</a:t>
             </a:r>
           </a:p>
@@ -10931,41 +10990,19 @@
               </a:lnSpc>
             </a:pPr>
             <a:r>
-              <a:rPr lang="fr-FR" sz="1700"/>
+              <a:rPr lang="fr-FR" sz="1700" dirty="0"/>
               <a:t>flip_vertical </a:t>
             </a:r>
           </a:p>
           <a:p>
-            <a:pPr>
+            <a:pPr lvl="3">
               <a:lnSpc>
                 <a:spcPct val="90000"/>
               </a:lnSpc>
             </a:pPr>
             <a:r>
-              <a:rPr lang="fr-FR" sz="1700"/>
-              <a:t>Toutes les fonctions sont documentées, spécifiées et testées;</a:t>
-            </a:r>
-          </a:p>
-          <a:p>
-            <a:pPr lvl="1">
-              <a:lnSpc>
-                <a:spcPct val="90000"/>
-              </a:lnSpc>
-            </a:pPr>
-            <a:r>
-              <a:rPr lang="fr-FR" sz="1700"/>
-              <a:t>Note: les fonctions de déplacement marchent tous sur tous tableaux avec le même nombre de colonnes sur chaque ligne et la fonction dessine marche affiche bien sur les plateau avec un nombre de colonnes égale a 4.</a:t>
-            </a:r>
-          </a:p>
-          <a:p>
-            <a:pPr>
-              <a:lnSpc>
-                <a:spcPct val="90000"/>
-              </a:lnSpc>
-            </a:pPr>
-            <a:r>
-              <a:rPr lang="fr-FR" sz="1700"/>
-              <a:t>On dispose d’un bon affichage du plateau de jeu</a:t>
+              <a:rPr lang="fr-FR" sz="1700" dirty="0"/>
+              <a:t>nouvelleCase</a:t>
             </a:r>
           </a:p>
         </p:txBody>
@@ -10984,675 +11021,6 @@
 </file>
 
 <file path=ppt/slides/slide4.xml><?xml version="1.0" encoding="utf-8"?>
-<p:sld xmlns:a="http://schemas.openxmlformats.org/drawingml/2006/main" xmlns:r="http://schemas.openxmlformats.org/officeDocument/2006/relationships" xmlns:p="http://schemas.openxmlformats.org/presentationml/2006/main">
-  <p:cSld>
-    <p:spTree>
-      <p:nvGrpSpPr>
-        <p:cNvPr id="1" name=""/>
-        <p:cNvGrpSpPr/>
-        <p:nvPr/>
-      </p:nvGrpSpPr>
-      <p:grpSpPr>
-        <a:xfrm>
-          <a:off x="0" y="0"/>
-          <a:ext cx="0" cy="0"/>
-          <a:chOff x="0" y="0"/>
-          <a:chExt cx="0" cy="0"/>
-        </a:xfrm>
-      </p:grpSpPr>
-      <p:sp>
-        <p:nvSpPr>
-          <p:cNvPr id="2" name="Title 1">
-            <a:extLst>
-              <a:ext uri="{FF2B5EF4-FFF2-40B4-BE49-F238E27FC236}">
-                <a16:creationId xmlns:a16="http://schemas.microsoft.com/office/drawing/2014/main" id="{1E5A8199-6959-CA42-B906-2ED572DC8CBB}"/>
-              </a:ext>
-            </a:extLst>
-          </p:cNvPr>
-          <p:cNvSpPr>
-            <a:spLocks noGrp="1"/>
-          </p:cNvSpPr>
-          <p:nvPr>
-            <p:ph type="ctrTitle"/>
-          </p:nvPr>
-        </p:nvSpPr>
-        <p:spPr/>
-        <p:txBody>
-          <a:bodyPr/>
-          <a:lstStyle/>
-          <a:p>
-            <a:r>
-              <a:rPr lang="fr-FR" dirty="0"/>
-              <a:t>Niveau 1</a:t>
-            </a:r>
-          </a:p>
-        </p:txBody>
-      </p:sp>
-    </p:spTree>
-    <p:extLst>
-      <p:ext uri="{BB962C8B-B14F-4D97-AF65-F5344CB8AC3E}">
-        <p14:creationId xmlns:p14="http://schemas.microsoft.com/office/powerpoint/2010/main" val="3853121290"/>
-      </p:ext>
-    </p:extLst>
-  </p:cSld>
-  <p:clrMapOvr>
-    <a:masterClrMapping/>
-  </p:clrMapOvr>
-</p:sld>
-</file>
-
-<file path=ppt/slides/slide5.xml><?xml version="1.0" encoding="utf-8"?>
-<p:sld xmlns:a="http://schemas.openxmlformats.org/drawingml/2006/main" xmlns:r="http://schemas.openxmlformats.org/officeDocument/2006/relationships" xmlns:p="http://schemas.openxmlformats.org/presentationml/2006/main">
-  <p:cSld>
-    <p:bg>
-      <p:bgPr>
-        <a:solidFill>
-          <a:schemeClr val="bg1"/>
-        </a:solidFill>
-        <a:effectLst/>
-      </p:bgPr>
-    </p:bg>
-    <p:spTree>
-      <p:nvGrpSpPr>
-        <p:cNvPr id="1" name=""/>
-        <p:cNvGrpSpPr/>
-        <p:nvPr/>
-      </p:nvGrpSpPr>
-      <p:grpSpPr>
-        <a:xfrm>
-          <a:off x="0" y="0"/>
-          <a:ext cx="0" cy="0"/>
-          <a:chOff x="0" y="0"/>
-          <a:chExt cx="0" cy="0"/>
-        </a:xfrm>
-      </p:grpSpPr>
-      <p:sp>
-        <p:nvSpPr>
-          <p:cNvPr id="24" name="Freeform 6">
-            <a:extLst>
-              <a:ext uri="{FF2B5EF4-FFF2-40B4-BE49-F238E27FC236}">
-                <a16:creationId xmlns:a16="http://schemas.microsoft.com/office/drawing/2014/main" id="{53576798-7F98-4C7F-B6C7-6D41B5A7E927}"/>
-              </a:ext>
-              <a:ext uri="{C183D7F6-B498-43B3-948B-1728B52AA6E4}">
-                <adec:decorative xmlns:adec="http://schemas.microsoft.com/office/drawing/2017/decorative" val="1"/>
-              </a:ext>
-            </a:extLst>
-          </p:cNvPr>
-          <p:cNvSpPr>
-            <a:spLocks noGrp="1" noRot="1" noChangeAspect="1" noMove="1" noResize="1" noEditPoints="1" noAdjustHandles="1" noChangeArrowheads="1" noChangeShapeType="1" noTextEdit="1"/>
-          </p:cNvSpPr>
-          <p:nvPr>
-            <p:extLst>
-              <p:ext uri="{386F3935-93C4-4BCD-93E2-E3B085C9AB24}">
-                <p16:designElem xmlns:p16="http://schemas.microsoft.com/office/powerpoint/2015/main" val="1"/>
-              </p:ext>
-            </p:extLst>
-          </p:nvPr>
-        </p:nvSpPr>
-        <p:spPr bwMode="auto">
-          <a:xfrm>
-            <a:off x="0" y="0"/>
-            <a:ext cx="12192000" cy="2185988"/>
-          </a:xfrm>
-          <a:custGeom>
-            <a:avLst/>
-            <a:gdLst/>
-            <a:ahLst/>
-            <a:cxnLst/>
-            <a:rect l="0" t="0" r="r" b="b"/>
-            <a:pathLst>
-              <a:path w="5760" h="1377">
-                <a:moveTo>
-                  <a:pt x="5760" y="0"/>
-                </a:moveTo>
-                <a:lnTo>
-                  <a:pt x="0" y="0"/>
-                </a:lnTo>
-                <a:lnTo>
-                  <a:pt x="0" y="1189"/>
-                </a:lnTo>
-                <a:lnTo>
-                  <a:pt x="943" y="1189"/>
-                </a:lnTo>
-                <a:lnTo>
-                  <a:pt x="1123" y="1369"/>
-                </a:lnTo>
-                <a:lnTo>
-                  <a:pt x="1123" y="1369"/>
-                </a:lnTo>
-                <a:lnTo>
-                  <a:pt x="1127" y="1371"/>
-                </a:lnTo>
-                <a:lnTo>
-                  <a:pt x="1133" y="1374"/>
-                </a:lnTo>
-                <a:lnTo>
-                  <a:pt x="1139" y="1377"/>
-                </a:lnTo>
-                <a:lnTo>
-                  <a:pt x="1144" y="1377"/>
-                </a:lnTo>
-                <a:lnTo>
-                  <a:pt x="1150" y="1377"/>
-                </a:lnTo>
-                <a:lnTo>
-                  <a:pt x="1155" y="1374"/>
-                </a:lnTo>
-                <a:lnTo>
-                  <a:pt x="1161" y="1371"/>
-                </a:lnTo>
-                <a:lnTo>
-                  <a:pt x="1165" y="1369"/>
-                </a:lnTo>
-                <a:lnTo>
-                  <a:pt x="1345" y="1189"/>
-                </a:lnTo>
-                <a:lnTo>
-                  <a:pt x="5760" y="1189"/>
-                </a:lnTo>
-                <a:lnTo>
-                  <a:pt x="5760" y="0"/>
-                </a:lnTo>
-                <a:close/>
-              </a:path>
-            </a:pathLst>
-          </a:custGeom>
-          <a:ln/>
-          <a:extLst>
-            <a:ext uri="{91240B29-F687-4f45-9708-019B960494DF}">
-              <a14:hiddenLine xmlns="" xmlns:a16="http://schemas.microsoft.com/office/drawing/2014/main" xmlns:p14="http://schemas.microsoft.com/office/powerpoint/2010/main" xmlns:a14="http://schemas.microsoft.com/office/drawing/2010/main" w="9525">
-                <a:solidFill>
-                  <a:srgbClr val="000000"/>
-                </a:solidFill>
-                <a:round/>
-                <a:headEnd/>
-                <a:tailEnd/>
-              </a14:hiddenLine>
-            </a:ext>
-          </a:extLst>
-        </p:spPr>
-        <p:style>
-          <a:lnRef idx="1">
-            <a:schemeClr val="accent1"/>
-          </a:lnRef>
-          <a:fillRef idx="3">
-            <a:schemeClr val="accent1"/>
-          </a:fillRef>
-          <a:effectRef idx="2">
-            <a:schemeClr val="accent1"/>
-          </a:effectRef>
-          <a:fontRef idx="minor">
-            <a:schemeClr val="lt1"/>
-          </a:fontRef>
-        </p:style>
-      </p:sp>
-      <p:sp>
-        <p:nvSpPr>
-          <p:cNvPr id="25" name="Rectangle 12">
-            <a:extLst>
-              <a:ext uri="{FF2B5EF4-FFF2-40B4-BE49-F238E27FC236}">
-                <a16:creationId xmlns:a16="http://schemas.microsoft.com/office/drawing/2014/main" id="{8C1FC8BA-94E6-44F7-B346-6A2215E66D2E}"/>
-              </a:ext>
-              <a:ext uri="{C183D7F6-B498-43B3-948B-1728B52AA6E4}">
-                <adec:decorative xmlns:adec="http://schemas.microsoft.com/office/drawing/2017/decorative" val="1"/>
-              </a:ext>
-            </a:extLst>
-          </p:cNvPr>
-          <p:cNvSpPr>
-            <a:spLocks noGrp="1" noRot="1" noChangeAspect="1" noMove="1" noResize="1" noEditPoints="1" noAdjustHandles="1" noChangeArrowheads="1" noChangeShapeType="1" noTextEdit="1"/>
-          </p:cNvSpPr>
-          <p:nvPr>
-            <p:extLst>
-              <p:ext uri="{386F3935-93C4-4BCD-93E2-E3B085C9AB24}">
-                <p16:designElem xmlns:p16="http://schemas.microsoft.com/office/powerpoint/2015/main" val="1"/>
-              </p:ext>
-            </p:extLst>
-          </p:nvPr>
-        </p:nvSpPr>
-        <p:spPr>
-          <a:xfrm>
-            <a:off x="0" y="0"/>
-            <a:ext cx="12188952" cy="6858000"/>
-          </a:xfrm>
-          <a:prstGeom prst="rect">
-            <a:avLst/>
-          </a:prstGeom>
-          <a:solidFill>
-            <a:schemeClr val="bg1"/>
-          </a:solidFill>
-          <a:ln>
-            <a:noFill/>
-          </a:ln>
-        </p:spPr>
-        <p:style>
-          <a:lnRef idx="2">
-            <a:schemeClr val="accent1">
-              <a:shade val="50000"/>
-            </a:schemeClr>
-          </a:lnRef>
-          <a:fillRef idx="1">
-            <a:schemeClr val="accent1"/>
-          </a:fillRef>
-          <a:effectRef idx="0">
-            <a:schemeClr val="accent1"/>
-          </a:effectRef>
-          <a:fontRef idx="minor">
-            <a:schemeClr val="lt1"/>
-          </a:fontRef>
-        </p:style>
-        <p:txBody>
-          <a:bodyPr rtlCol="0" anchor="ctr"/>
-          <a:lstStyle/>
-          <a:p>
-            <a:pPr algn="ctr"/>
-            <a:endParaRPr lang="en-US"/>
-          </a:p>
-        </p:txBody>
-      </p:sp>
-      <p:sp>
-        <p:nvSpPr>
-          <p:cNvPr id="26" name="Freeform 23">
-            <a:extLst>
-              <a:ext uri="{FF2B5EF4-FFF2-40B4-BE49-F238E27FC236}">
-                <a16:creationId xmlns:a16="http://schemas.microsoft.com/office/drawing/2014/main" id="{A8329D92-4903-43FF-90F4-878F5D3F1D22}"/>
-              </a:ext>
-              <a:ext uri="{C183D7F6-B498-43B3-948B-1728B52AA6E4}">
-                <adec:decorative xmlns:adec="http://schemas.microsoft.com/office/drawing/2017/decorative" val="1"/>
-              </a:ext>
-            </a:extLst>
-          </p:cNvPr>
-          <p:cNvSpPr>
-            <a:spLocks noGrp="1" noRot="1" noChangeAspect="1" noMove="1" noResize="1" noEditPoints="1" noAdjustHandles="1" noChangeArrowheads="1" noChangeShapeType="1" noTextEdit="1"/>
-          </p:cNvSpPr>
-          <p:nvPr>
-            <p:extLst>
-              <p:ext uri="{386F3935-93C4-4BCD-93E2-E3B085C9AB24}">
-                <p16:designElem xmlns:p16="http://schemas.microsoft.com/office/powerpoint/2015/main" val="1"/>
-              </p:ext>
-            </p:extLst>
-          </p:nvPr>
-        </p:nvSpPr>
-        <p:spPr bwMode="white">
-          <a:xfrm>
-            <a:off x="0" y="0"/>
-            <a:ext cx="4637005" cy="6858000"/>
-          </a:xfrm>
-          <a:custGeom>
-            <a:avLst/>
-            <a:gdLst>
-              <a:gd name="connsiteX0" fmla="*/ 0 w 4637005"/>
-              <a:gd name="connsiteY0" fmla="*/ 0 h 6858000"/>
-              <a:gd name="connsiteX1" fmla="*/ 4637005 w 4637005"/>
-              <a:gd name="connsiteY1" fmla="*/ 0 h 6858000"/>
-              <a:gd name="connsiteX2" fmla="*/ 4637005 w 4637005"/>
-              <a:gd name="connsiteY2" fmla="*/ 1900238 h 6858000"/>
-              <a:gd name="connsiteX3" fmla="*/ 4266589 w 4637005"/>
-              <a:gd name="connsiteY3" fmla="*/ 2178050 h 6858000"/>
-              <a:gd name="connsiteX4" fmla="*/ 4262355 w 4637005"/>
-              <a:gd name="connsiteY4" fmla="*/ 2184400 h 6858000"/>
-              <a:gd name="connsiteX5" fmla="*/ 4256005 w 4637005"/>
-              <a:gd name="connsiteY5" fmla="*/ 2193925 h 6858000"/>
-              <a:gd name="connsiteX6" fmla="*/ 4249655 w 4637005"/>
-              <a:gd name="connsiteY6" fmla="*/ 2201863 h 6858000"/>
-              <a:gd name="connsiteX7" fmla="*/ 4249655 w 4637005"/>
-              <a:gd name="connsiteY7" fmla="*/ 2211388 h 6858000"/>
-              <a:gd name="connsiteX8" fmla="*/ 4249655 w 4637005"/>
-              <a:gd name="connsiteY8" fmla="*/ 2220913 h 6858000"/>
-              <a:gd name="connsiteX9" fmla="*/ 4256005 w 4637005"/>
-              <a:gd name="connsiteY9" fmla="*/ 2228850 h 6858000"/>
-              <a:gd name="connsiteX10" fmla="*/ 4262355 w 4637005"/>
-              <a:gd name="connsiteY10" fmla="*/ 2238375 h 6858000"/>
-              <a:gd name="connsiteX11" fmla="*/ 4266589 w 4637005"/>
-              <a:gd name="connsiteY11" fmla="*/ 2244725 h 6858000"/>
-              <a:gd name="connsiteX12" fmla="*/ 4637005 w 4637005"/>
-              <a:gd name="connsiteY12" fmla="*/ 2522538 h 6858000"/>
-              <a:gd name="connsiteX13" fmla="*/ 4637005 w 4637005"/>
-              <a:gd name="connsiteY13" fmla="*/ 6858000 h 6858000"/>
-              <a:gd name="connsiteX14" fmla="*/ 0 w 4637005"/>
-              <a:gd name="connsiteY14" fmla="*/ 6858000 h 6858000"/>
-            </a:gdLst>
-            <a:ahLst/>
-            <a:cxnLst>
-              <a:cxn ang="0">
-                <a:pos x="connsiteX0" y="connsiteY0"/>
-              </a:cxn>
-              <a:cxn ang="0">
-                <a:pos x="connsiteX1" y="connsiteY1"/>
-              </a:cxn>
-              <a:cxn ang="0">
-                <a:pos x="connsiteX2" y="connsiteY2"/>
-              </a:cxn>
-              <a:cxn ang="0">
-                <a:pos x="connsiteX3" y="connsiteY3"/>
-              </a:cxn>
-              <a:cxn ang="0">
-                <a:pos x="connsiteX4" y="connsiteY4"/>
-              </a:cxn>
-              <a:cxn ang="0">
-                <a:pos x="connsiteX5" y="connsiteY5"/>
-              </a:cxn>
-              <a:cxn ang="0">
-                <a:pos x="connsiteX6" y="connsiteY6"/>
-              </a:cxn>
-              <a:cxn ang="0">
-                <a:pos x="connsiteX7" y="connsiteY7"/>
-              </a:cxn>
-              <a:cxn ang="0">
-                <a:pos x="connsiteX8" y="connsiteY8"/>
-              </a:cxn>
-              <a:cxn ang="0">
-                <a:pos x="connsiteX9" y="connsiteY9"/>
-              </a:cxn>
-              <a:cxn ang="0">
-                <a:pos x="connsiteX10" y="connsiteY10"/>
-              </a:cxn>
-              <a:cxn ang="0">
-                <a:pos x="connsiteX11" y="connsiteY11"/>
-              </a:cxn>
-              <a:cxn ang="0">
-                <a:pos x="connsiteX12" y="connsiteY12"/>
-              </a:cxn>
-              <a:cxn ang="0">
-                <a:pos x="connsiteX13" y="connsiteY13"/>
-              </a:cxn>
-              <a:cxn ang="0">
-                <a:pos x="connsiteX14" y="connsiteY14"/>
-              </a:cxn>
-            </a:cxnLst>
-            <a:rect l="l" t="t" r="r" b="b"/>
-            <a:pathLst>
-              <a:path w="4637005" h="6858000">
-                <a:moveTo>
-                  <a:pt x="0" y="0"/>
-                </a:moveTo>
-                <a:lnTo>
-                  <a:pt x="4637005" y="0"/>
-                </a:lnTo>
-                <a:lnTo>
-                  <a:pt x="4637005" y="1900238"/>
-                </a:lnTo>
-                <a:lnTo>
-                  <a:pt x="4266589" y="2178050"/>
-                </a:lnTo>
-                <a:lnTo>
-                  <a:pt x="4262355" y="2184400"/>
-                </a:lnTo>
-                <a:lnTo>
-                  <a:pt x="4256005" y="2193925"/>
-                </a:lnTo>
-                <a:lnTo>
-                  <a:pt x="4249655" y="2201863"/>
-                </a:lnTo>
-                <a:lnTo>
-                  <a:pt x="4249655" y="2211388"/>
-                </a:lnTo>
-                <a:lnTo>
-                  <a:pt x="4249655" y="2220913"/>
-                </a:lnTo>
-                <a:lnTo>
-                  <a:pt x="4256005" y="2228850"/>
-                </a:lnTo>
-                <a:lnTo>
-                  <a:pt x="4262355" y="2238375"/>
-                </a:lnTo>
-                <a:lnTo>
-                  <a:pt x="4266589" y="2244725"/>
-                </a:lnTo>
-                <a:lnTo>
-                  <a:pt x="4637005" y="2522538"/>
-                </a:lnTo>
-                <a:lnTo>
-                  <a:pt x="4637005" y="6858000"/>
-                </a:lnTo>
-                <a:lnTo>
-                  <a:pt x="0" y="6858000"/>
-                </a:lnTo>
-                <a:close/>
-              </a:path>
-            </a:pathLst>
-          </a:custGeom>
-          <a:solidFill>
-            <a:srgbClr val="262626"/>
-          </a:solidFill>
-          <a:ln>
-            <a:noFill/>
-          </a:ln>
-        </p:spPr>
-        <p:style>
-          <a:lnRef idx="2">
-            <a:schemeClr val="accent1">
-              <a:shade val="50000"/>
-            </a:schemeClr>
-          </a:lnRef>
-          <a:fillRef idx="1">
-            <a:schemeClr val="accent1"/>
-          </a:fillRef>
-          <a:effectRef idx="0">
-            <a:schemeClr val="accent1"/>
-          </a:effectRef>
-          <a:fontRef idx="minor">
-            <a:schemeClr val="lt1"/>
-          </a:fontRef>
-        </p:style>
-        <p:txBody>
-          <a:bodyPr wrap="square" rtlCol="0" anchor="ctr">
-            <a:noAutofit/>
-          </a:bodyPr>
-          <a:lstStyle/>
-          <a:p>
-            <a:pPr algn="ctr"/>
-            <a:endParaRPr lang="en-US"/>
-          </a:p>
-        </p:txBody>
-      </p:sp>
-      <p:sp>
-        <p:nvSpPr>
-          <p:cNvPr id="2" name="Title 1">
-            <a:extLst>
-              <a:ext uri="{FF2B5EF4-FFF2-40B4-BE49-F238E27FC236}">
-                <a16:creationId xmlns:a16="http://schemas.microsoft.com/office/drawing/2014/main" id="{84574A78-8DD4-4A4A-8CEA-AC048042931B}"/>
-              </a:ext>
-            </a:extLst>
-          </p:cNvPr>
-          <p:cNvSpPr>
-            <a:spLocks noGrp="1"/>
-          </p:cNvSpPr>
-          <p:nvPr>
-            <p:ph type="title"/>
-          </p:nvPr>
-        </p:nvSpPr>
-        <p:spPr>
-          <a:xfrm>
-            <a:off x="810001" y="447188"/>
-            <a:ext cx="3413084" cy="1559412"/>
-          </a:xfrm>
-        </p:spPr>
-        <p:txBody>
-          <a:bodyPr vert="horz" lIns="91440" tIns="45720" rIns="91440" bIns="45720" rtlCol="0" anchor="b">
-            <a:normAutofit/>
-          </a:bodyPr>
-          <a:lstStyle/>
-          <a:p>
-            <a:r>
-              <a:rPr lang="en-US" sz="3200"/>
-              <a:t>1.1 utilisation de la bibliothèque ncurse:</a:t>
-            </a:r>
-          </a:p>
-        </p:txBody>
-      </p:sp>
-      <p:sp>
-        <p:nvSpPr>
-          <p:cNvPr id="3" name="Content Placeholder 2">
-            <a:extLst>
-              <a:ext uri="{FF2B5EF4-FFF2-40B4-BE49-F238E27FC236}">
-                <a16:creationId xmlns:a16="http://schemas.microsoft.com/office/drawing/2014/main" id="{6B79532C-9214-9C42-8BFF-F42C717DF159}"/>
-              </a:ext>
-            </a:extLst>
-          </p:cNvPr>
-          <p:cNvSpPr>
-            <a:spLocks noGrp="1"/>
-          </p:cNvSpPr>
-          <p:nvPr>
-            <p:ph sz="half" idx="1"/>
-          </p:nvPr>
-        </p:nvSpPr>
-        <p:spPr>
-          <a:xfrm>
-            <a:off x="818713" y="2413000"/>
-            <a:ext cx="3404372" cy="3632200"/>
-          </a:xfrm>
-        </p:spPr>
-        <p:txBody>
-          <a:bodyPr vert="horz" lIns="91440" tIns="45720" rIns="91440" bIns="45720" rtlCol="0" anchor="ctr">
-            <a:normAutofit/>
-          </a:bodyPr>
-          <a:lstStyle/>
-          <a:p>
-            <a:r>
-              <a:rPr lang="en-US" sz="1600">
-                <a:solidFill>
-                  <a:srgbClr val="FFFFFF"/>
-                </a:solidFill>
-              </a:rPr>
-              <a:t>Couleur jaune globale du plateau de jeu et le score.</a:t>
-            </a:r>
-          </a:p>
-          <a:p>
-            <a:r>
-              <a:rPr lang="en-US" sz="1600">
-                <a:solidFill>
-                  <a:srgbClr val="FFFFFF"/>
-                </a:solidFill>
-              </a:rPr>
-              <a:t>Couleur blanche sur fond rouge pour le texte de fin de jeu</a:t>
-            </a:r>
-          </a:p>
-          <a:p>
-            <a:r>
-              <a:rPr lang="en-US" sz="1600">
-                <a:solidFill>
-                  <a:srgbClr val="FFFFFF"/>
-                </a:solidFill>
-              </a:rPr>
-              <a:t>Couleur noir sur fond blanc pour le score de fin de partie</a:t>
-            </a:r>
-          </a:p>
-        </p:txBody>
-      </p:sp>
-      <p:sp>
-        <p:nvSpPr>
-          <p:cNvPr id="17" name="Rounded Rectangle 17">
-            <a:extLst>
-              <a:ext uri="{FF2B5EF4-FFF2-40B4-BE49-F238E27FC236}">
-                <a16:creationId xmlns:a16="http://schemas.microsoft.com/office/drawing/2014/main" id="{567B1EEF-AB32-40F7-AD5F-41E0EA001EBE}"/>
-              </a:ext>
-              <a:ext uri="{C183D7F6-B498-43B3-948B-1728B52AA6E4}">
-                <adec:decorative xmlns:adec="http://schemas.microsoft.com/office/drawing/2017/decorative" val="1"/>
-              </a:ext>
-            </a:extLst>
-          </p:cNvPr>
-          <p:cNvSpPr>
-            <a:spLocks noGrp="1" noRot="1" noChangeAspect="1" noMove="1" noResize="1" noEditPoints="1" noAdjustHandles="1" noChangeArrowheads="1" noChangeShapeType="1" noTextEdit="1"/>
-          </p:cNvSpPr>
-          <p:nvPr>
-            <p:extLst>
-              <p:ext uri="{386F3935-93C4-4BCD-93E2-E3B085C9AB24}">
-                <p16:designElem xmlns:p16="http://schemas.microsoft.com/office/powerpoint/2015/main" val="1"/>
-              </p:ext>
-            </p:extLst>
-          </p:nvPr>
-        </p:nvSpPr>
-        <p:spPr>
-          <a:xfrm>
-            <a:off x="5278945" y="958640"/>
-            <a:ext cx="6269591" cy="4945244"/>
-          </a:xfrm>
-          <a:prstGeom prst="roundRect">
-            <a:avLst>
-              <a:gd name="adj" fmla="val 3513"/>
-            </a:avLst>
-          </a:prstGeom>
-          <a:solidFill>
-            <a:schemeClr val="bg1"/>
-          </a:solidFill>
-          <a:ln>
-            <a:solidFill>
-              <a:schemeClr val="accent1"/>
-            </a:solidFill>
-          </a:ln>
-          <a:effectLst/>
-        </p:spPr>
-        <p:style>
-          <a:lnRef idx="2">
-            <a:schemeClr val="accent1">
-              <a:shade val="50000"/>
-            </a:schemeClr>
-          </a:lnRef>
-          <a:fillRef idx="1">
-            <a:schemeClr val="accent1"/>
-          </a:fillRef>
-          <a:effectRef idx="0">
-            <a:schemeClr val="accent1"/>
-          </a:effectRef>
-          <a:fontRef idx="minor">
-            <a:schemeClr val="lt1"/>
-          </a:fontRef>
-        </p:style>
-        <p:txBody>
-          <a:bodyPr rtlCol="0" anchor="ctr"/>
-          <a:lstStyle/>
-          <a:p>
-            <a:pPr algn="ctr"/>
-            <a:endParaRPr lang="en-US"/>
-          </a:p>
-        </p:txBody>
-      </p:sp>
-      <p:pic>
-        <p:nvPicPr>
-          <p:cNvPr id="6" name="Content Placeholder 5">
-            <a:extLst>
-              <a:ext uri="{FF2B5EF4-FFF2-40B4-BE49-F238E27FC236}">
-                <a16:creationId xmlns:a16="http://schemas.microsoft.com/office/drawing/2014/main" id="{AEDCD27C-561A-FA41-9B76-33188141C53F}"/>
-              </a:ext>
-            </a:extLst>
-          </p:cNvPr>
-          <p:cNvPicPr>
-            <a:picLocks noGrp="1" noChangeAspect="1"/>
-          </p:cNvPicPr>
-          <p:nvPr>
-            <p:ph sz="half" idx="2"/>
-          </p:nvPr>
-        </p:nvPicPr>
-        <p:blipFill>
-          <a:blip r:embed="rId2"/>
-          <a:stretch>
-            <a:fillRect/>
-          </a:stretch>
-        </p:blipFill>
-        <p:spPr>
-          <a:xfrm>
-            <a:off x="6349605" y="1258529"/>
-            <a:ext cx="4147054" cy="4330205"/>
-          </a:xfrm>
-          <a:prstGeom prst="rect">
-            <a:avLst/>
-          </a:prstGeom>
-        </p:spPr>
-      </p:pic>
-    </p:spTree>
-    <p:extLst>
-      <p:ext uri="{BB962C8B-B14F-4D97-AF65-F5344CB8AC3E}">
-        <p14:creationId xmlns:p14="http://schemas.microsoft.com/office/powerpoint/2010/main" val="3528297022"/>
-      </p:ext>
-    </p:extLst>
-  </p:cSld>
-  <p:clrMapOvr>
-    <a:overrideClrMapping bg1="lt1" tx1="dk1" bg2="lt2" tx2="dk2" accent1="accent1" accent2="accent2" accent3="accent3" accent4="accent4" accent5="accent5" accent6="accent6" hlink="hlink" folHlink="folHlink"/>
-  </p:clrMapOvr>
-</p:sld>
-</file>
-
-<file path=ppt/slides/slide6.xml><?xml version="1.0" encoding="utf-8"?>
 <p:sld xmlns:a="http://schemas.openxmlformats.org/drawingml/2006/main" xmlns:r="http://schemas.openxmlformats.org/officeDocument/2006/relationships" xmlns:p="http://schemas.openxmlformats.org/presentationml/2006/main">
   <p:cSld>
     <p:bg>
@@ -11677,129 +11045,9 @@
           <a:chExt cx="0" cy="0"/>
         </a:xfrm>
       </p:grpSpPr>
-      <p:sp>
-        <p:nvSpPr>
-          <p:cNvPr id="8" name="Freeform 6">
-            <a:extLst>
-              <a:ext uri="{FF2B5EF4-FFF2-40B4-BE49-F238E27FC236}">
-                <a16:creationId xmlns:a16="http://schemas.microsoft.com/office/drawing/2014/main" id="{8EE457FF-670E-4EC1-ACD4-1173DA9A7975}"/>
-              </a:ext>
-              <a:ext uri="{C183D7F6-B498-43B3-948B-1728B52AA6E4}">
-                <adec:decorative xmlns:adec="http://schemas.microsoft.com/office/drawing/2017/decorative" val="1"/>
-              </a:ext>
-            </a:extLst>
-          </p:cNvPr>
-          <p:cNvSpPr>
-            <a:spLocks noGrp="1" noRot="1" noChangeAspect="1" noMove="1" noResize="1" noEditPoints="1" noAdjustHandles="1" noChangeArrowheads="1" noChangeShapeType="1" noTextEdit="1"/>
-          </p:cNvSpPr>
-          <p:nvPr>
-            <p:extLst>
-              <p:ext uri="{386F3935-93C4-4BCD-93E2-E3B085C9AB24}">
-                <p16:designElem xmlns:p16="http://schemas.microsoft.com/office/powerpoint/2015/main" val="1"/>
-              </p:ext>
-            </p:extLst>
-          </p:nvPr>
-        </p:nvSpPr>
-        <p:spPr bwMode="auto">
-          <a:xfrm>
-            <a:off x="0" y="0"/>
-            <a:ext cx="12192000" cy="2185988"/>
-          </a:xfrm>
-          <a:custGeom>
-            <a:avLst/>
-            <a:gdLst/>
-            <a:ahLst/>
-            <a:cxnLst/>
-            <a:rect l="0" t="0" r="r" b="b"/>
-            <a:pathLst>
-              <a:path w="5760" h="1377">
-                <a:moveTo>
-                  <a:pt x="5760" y="0"/>
-                </a:moveTo>
-                <a:lnTo>
-                  <a:pt x="0" y="0"/>
-                </a:lnTo>
-                <a:lnTo>
-                  <a:pt x="0" y="1189"/>
-                </a:lnTo>
-                <a:lnTo>
-                  <a:pt x="943" y="1189"/>
-                </a:lnTo>
-                <a:lnTo>
-                  <a:pt x="1123" y="1369"/>
-                </a:lnTo>
-                <a:lnTo>
-                  <a:pt x="1123" y="1369"/>
-                </a:lnTo>
-                <a:lnTo>
-                  <a:pt x="1127" y="1371"/>
-                </a:lnTo>
-                <a:lnTo>
-                  <a:pt x="1133" y="1374"/>
-                </a:lnTo>
-                <a:lnTo>
-                  <a:pt x="1139" y="1377"/>
-                </a:lnTo>
-                <a:lnTo>
-                  <a:pt x="1144" y="1377"/>
-                </a:lnTo>
-                <a:lnTo>
-                  <a:pt x="1150" y="1377"/>
-                </a:lnTo>
-                <a:lnTo>
-                  <a:pt x="1155" y="1374"/>
-                </a:lnTo>
-                <a:lnTo>
-                  <a:pt x="1161" y="1371"/>
-                </a:lnTo>
-                <a:lnTo>
-                  <a:pt x="1165" y="1369"/>
-                </a:lnTo>
-                <a:lnTo>
-                  <a:pt x="1345" y="1189"/>
-                </a:lnTo>
-                <a:lnTo>
-                  <a:pt x="5760" y="1189"/>
-                </a:lnTo>
-                <a:lnTo>
-                  <a:pt x="5760" y="0"/>
-                </a:lnTo>
-                <a:close/>
-              </a:path>
-            </a:pathLst>
-          </a:custGeom>
-          <a:ln/>
-          <a:extLst>
-            <a:ext uri="{91240B29-F687-4f45-9708-019B960494DF}">
-              <a14:hiddenLine xmlns="" xmlns:a14="http://schemas.microsoft.com/office/drawing/2010/main" xmlns:a16="http://schemas.microsoft.com/office/drawing/2014/main" w="9525">
-                <a:solidFill>
-                  <a:srgbClr val="000000"/>
-                </a:solidFill>
-                <a:round/>
-                <a:headEnd/>
-                <a:tailEnd/>
-              </a14:hiddenLine>
-            </a:ext>
-          </a:extLst>
-        </p:spPr>
-        <p:style>
-          <a:lnRef idx="1">
-            <a:schemeClr val="accent1"/>
-          </a:lnRef>
-          <a:fillRef idx="3">
-            <a:schemeClr val="accent1"/>
-          </a:fillRef>
-          <a:effectRef idx="2">
-            <a:schemeClr val="accent1"/>
-          </a:effectRef>
-          <a:fontRef idx="minor">
-            <a:schemeClr val="lt1"/>
-          </a:fontRef>
-        </p:style>
-      </p:sp>
       <p:sp useBgFill="1">
         <p:nvSpPr>
-          <p:cNvPr id="10" name="Rectangle 9">
+          <p:cNvPr id="8" name="Rectangle 7">
             <a:extLst>
               <a:ext uri="{FF2B5EF4-FFF2-40B4-BE49-F238E27FC236}">
                 <a16:creationId xmlns:a16="http://schemas.microsoft.com/office/drawing/2014/main" id="{089A69AF-D57B-49B4-886C-D4A5DC194421}"/>
@@ -11859,7 +11107,7 @@
       </p:sp>
       <p:sp>
         <p:nvSpPr>
-          <p:cNvPr id="12" name="Freeform: Shape 11">
+          <p:cNvPr id="10" name="Freeform: Shape 9">
             <a:extLst>
               <a:ext uri="{FF2B5EF4-FFF2-40B4-BE49-F238E27FC236}">
                 <a16:creationId xmlns:a16="http://schemas.microsoft.com/office/drawing/2014/main" id="{CABDC08D-6093-4397-92D4-54D00E2BB1C2}"/>
@@ -12101,6 +11349,1219 @@
           <p:cNvPr id="2" name="Title 1">
             <a:extLst>
               <a:ext uri="{FF2B5EF4-FFF2-40B4-BE49-F238E27FC236}">
+                <a16:creationId xmlns:a16="http://schemas.microsoft.com/office/drawing/2014/main" id="{0AECE786-78AC-174C-811B-1D1D2E737D71}"/>
+              </a:ext>
+            </a:extLst>
+          </p:cNvPr>
+          <p:cNvSpPr>
+            <a:spLocks noGrp="1"/>
+          </p:cNvSpPr>
+          <p:nvPr>
+            <p:ph type="title"/>
+          </p:nvPr>
+        </p:nvSpPr>
+        <p:spPr>
+          <a:xfrm>
+            <a:off x="451515" y="1734857"/>
+            <a:ext cx="3765483" cy="3388287"/>
+          </a:xfrm>
+        </p:spPr>
+        <p:txBody>
+          <a:bodyPr anchor="ctr">
+            <a:normAutofit/>
+          </a:bodyPr>
+          <a:lstStyle/>
+          <a:p>
+            <a:r>
+              <a:rPr lang="fr-FR" dirty="0"/>
+              <a:t>Niveau 0</a:t>
+            </a:r>
+          </a:p>
+        </p:txBody>
+      </p:sp>
+      <p:sp>
+        <p:nvSpPr>
+          <p:cNvPr id="3" name="Content Placeholder 2">
+            <a:extLst>
+              <a:ext uri="{FF2B5EF4-FFF2-40B4-BE49-F238E27FC236}">
+                <a16:creationId xmlns:a16="http://schemas.microsoft.com/office/drawing/2014/main" id="{873D9288-8360-3F4C-8EB6-2AB7BB77A39D}"/>
+              </a:ext>
+            </a:extLst>
+          </p:cNvPr>
+          <p:cNvSpPr>
+            <a:spLocks noGrp="1"/>
+          </p:cNvSpPr>
+          <p:nvPr>
+            <p:ph idx="1"/>
+          </p:nvPr>
+        </p:nvSpPr>
+        <p:spPr>
+          <a:xfrm>
+            <a:off x="6008068" y="978993"/>
+            <a:ext cx="5365218" cy="4900014"/>
+          </a:xfrm>
+          <a:effectLst/>
+        </p:spPr>
+        <p:txBody>
+          <a:bodyPr>
+            <a:normAutofit/>
+          </a:bodyPr>
+          <a:lstStyle/>
+          <a:p>
+            <a:r>
+              <a:rPr lang="fr-FR"/>
+              <a:t>Toutes les fonctions sont documentées, spécifiées et testées;</a:t>
+            </a:r>
+          </a:p>
+          <a:p>
+            <a:pPr lvl="1"/>
+            <a:r>
+              <a:rPr lang="fr-FR"/>
+              <a:t>Note: les fonctions de déplacement marchent tous sur tous tableaux avec le même nombre de colonnes sur chaque ligne et la fonction dessine marche affiche bien sur les plateau avec un nombre de colonnes égale a 4.</a:t>
+            </a:r>
+          </a:p>
+          <a:p>
+            <a:r>
+              <a:rPr lang="fr-FR"/>
+              <a:t>On dispose d’un bon affichage du plateau de jeu</a:t>
+            </a:r>
+          </a:p>
+          <a:p>
+            <a:endParaRPr lang="fr-FR" dirty="0"/>
+          </a:p>
+        </p:txBody>
+      </p:sp>
+    </p:spTree>
+    <p:extLst>
+      <p:ext uri="{BB962C8B-B14F-4D97-AF65-F5344CB8AC3E}">
+        <p14:creationId xmlns:p14="http://schemas.microsoft.com/office/powerpoint/2010/main" val="3595904135"/>
+      </p:ext>
+    </p:extLst>
+  </p:cSld>
+  <p:clrMapOvr>
+    <a:masterClrMapping/>
+  </p:clrMapOvr>
+</p:sld>
+</file>
+
+<file path=ppt/slides/slide5.xml><?xml version="1.0" encoding="utf-8"?>
+<p:sld xmlns:a="http://schemas.openxmlformats.org/drawingml/2006/main" xmlns:r="http://schemas.openxmlformats.org/officeDocument/2006/relationships" xmlns:p="http://schemas.openxmlformats.org/presentationml/2006/main">
+  <p:cSld>
+    <p:spTree>
+      <p:nvGrpSpPr>
+        <p:cNvPr id="1" name=""/>
+        <p:cNvGrpSpPr/>
+        <p:nvPr/>
+      </p:nvGrpSpPr>
+      <p:grpSpPr>
+        <a:xfrm>
+          <a:off x="0" y="0"/>
+          <a:ext cx="0" cy="0"/>
+          <a:chOff x="0" y="0"/>
+          <a:chExt cx="0" cy="0"/>
+        </a:xfrm>
+      </p:grpSpPr>
+      <p:sp>
+        <p:nvSpPr>
+          <p:cNvPr id="2" name="Title 1">
+            <a:extLst>
+              <a:ext uri="{FF2B5EF4-FFF2-40B4-BE49-F238E27FC236}">
+                <a16:creationId xmlns:a16="http://schemas.microsoft.com/office/drawing/2014/main" id="{1E5A8199-6959-CA42-B906-2ED572DC8CBB}"/>
+              </a:ext>
+            </a:extLst>
+          </p:cNvPr>
+          <p:cNvSpPr>
+            <a:spLocks noGrp="1"/>
+          </p:cNvSpPr>
+          <p:nvPr>
+            <p:ph type="ctrTitle"/>
+          </p:nvPr>
+        </p:nvSpPr>
+        <p:spPr/>
+        <p:txBody>
+          <a:bodyPr/>
+          <a:lstStyle/>
+          <a:p>
+            <a:r>
+              <a:rPr lang="fr-FR" dirty="0"/>
+              <a:t>Niveau 1</a:t>
+            </a:r>
+          </a:p>
+        </p:txBody>
+      </p:sp>
+    </p:spTree>
+    <p:extLst>
+      <p:ext uri="{BB962C8B-B14F-4D97-AF65-F5344CB8AC3E}">
+        <p14:creationId xmlns:p14="http://schemas.microsoft.com/office/powerpoint/2010/main" val="3853121290"/>
+      </p:ext>
+    </p:extLst>
+  </p:cSld>
+  <p:clrMapOvr>
+    <a:masterClrMapping/>
+  </p:clrMapOvr>
+</p:sld>
+</file>
+
+<file path=ppt/slides/slide6.xml><?xml version="1.0" encoding="utf-8"?>
+<p:sld xmlns:a="http://schemas.openxmlformats.org/drawingml/2006/main" xmlns:r="http://schemas.openxmlformats.org/officeDocument/2006/relationships" xmlns:p="http://schemas.openxmlformats.org/presentationml/2006/main">
+  <p:cSld>
+    <p:bg>
+      <p:bgPr>
+        <a:solidFill>
+          <a:schemeClr val="bg1"/>
+        </a:solidFill>
+        <a:effectLst/>
+      </p:bgPr>
+    </p:bg>
+    <p:spTree>
+      <p:nvGrpSpPr>
+        <p:cNvPr id="1" name=""/>
+        <p:cNvGrpSpPr/>
+        <p:nvPr/>
+      </p:nvGrpSpPr>
+      <p:grpSpPr>
+        <a:xfrm>
+          <a:off x="0" y="0"/>
+          <a:ext cx="0" cy="0"/>
+          <a:chOff x="0" y="0"/>
+          <a:chExt cx="0" cy="0"/>
+        </a:xfrm>
+      </p:grpSpPr>
+      <p:sp>
+        <p:nvSpPr>
+          <p:cNvPr id="24" name="Freeform 6">
+            <a:extLst>
+              <a:ext uri="{FF2B5EF4-FFF2-40B4-BE49-F238E27FC236}">
+                <a16:creationId xmlns:a16="http://schemas.microsoft.com/office/drawing/2014/main" id="{53576798-7F98-4C7F-B6C7-6D41B5A7E927}"/>
+              </a:ext>
+              <a:ext uri="{C183D7F6-B498-43B3-948B-1728B52AA6E4}">
+                <adec:decorative xmlns:adec="http://schemas.microsoft.com/office/drawing/2017/decorative" val="1"/>
+              </a:ext>
+            </a:extLst>
+          </p:cNvPr>
+          <p:cNvSpPr>
+            <a:spLocks noGrp="1" noRot="1" noChangeAspect="1" noMove="1" noResize="1" noEditPoints="1" noAdjustHandles="1" noChangeArrowheads="1" noChangeShapeType="1" noTextEdit="1"/>
+          </p:cNvSpPr>
+          <p:nvPr>
+            <p:extLst>
+              <p:ext uri="{386F3935-93C4-4BCD-93E2-E3B085C9AB24}">
+                <p16:designElem xmlns:p16="http://schemas.microsoft.com/office/powerpoint/2015/main" val="1"/>
+              </p:ext>
+            </p:extLst>
+          </p:nvPr>
+        </p:nvSpPr>
+        <p:spPr bwMode="auto">
+          <a:xfrm>
+            <a:off x="0" y="0"/>
+            <a:ext cx="12192000" cy="2185988"/>
+          </a:xfrm>
+          <a:custGeom>
+            <a:avLst/>
+            <a:gdLst/>
+            <a:ahLst/>
+            <a:cxnLst/>
+            <a:rect l="0" t="0" r="r" b="b"/>
+            <a:pathLst>
+              <a:path w="5760" h="1377">
+                <a:moveTo>
+                  <a:pt x="5760" y="0"/>
+                </a:moveTo>
+                <a:lnTo>
+                  <a:pt x="0" y="0"/>
+                </a:lnTo>
+                <a:lnTo>
+                  <a:pt x="0" y="1189"/>
+                </a:lnTo>
+                <a:lnTo>
+                  <a:pt x="943" y="1189"/>
+                </a:lnTo>
+                <a:lnTo>
+                  <a:pt x="1123" y="1369"/>
+                </a:lnTo>
+                <a:lnTo>
+                  <a:pt x="1123" y="1369"/>
+                </a:lnTo>
+                <a:lnTo>
+                  <a:pt x="1127" y="1371"/>
+                </a:lnTo>
+                <a:lnTo>
+                  <a:pt x="1133" y="1374"/>
+                </a:lnTo>
+                <a:lnTo>
+                  <a:pt x="1139" y="1377"/>
+                </a:lnTo>
+                <a:lnTo>
+                  <a:pt x="1144" y="1377"/>
+                </a:lnTo>
+                <a:lnTo>
+                  <a:pt x="1150" y="1377"/>
+                </a:lnTo>
+                <a:lnTo>
+                  <a:pt x="1155" y="1374"/>
+                </a:lnTo>
+                <a:lnTo>
+                  <a:pt x="1161" y="1371"/>
+                </a:lnTo>
+                <a:lnTo>
+                  <a:pt x="1165" y="1369"/>
+                </a:lnTo>
+                <a:lnTo>
+                  <a:pt x="1345" y="1189"/>
+                </a:lnTo>
+                <a:lnTo>
+                  <a:pt x="5760" y="1189"/>
+                </a:lnTo>
+                <a:lnTo>
+                  <a:pt x="5760" y="0"/>
+                </a:lnTo>
+                <a:close/>
+              </a:path>
+            </a:pathLst>
+          </a:custGeom>
+          <a:ln/>
+          <a:extLst>
+            <a:ext uri="{91240B29-F687-4f45-9708-019B960494DF}">
+              <a14:hiddenLine xmlns="" xmlns:a16="http://schemas.microsoft.com/office/drawing/2014/main" xmlns:p14="http://schemas.microsoft.com/office/powerpoint/2010/main" xmlns:a14="http://schemas.microsoft.com/office/drawing/2010/main" w="9525">
+                <a:solidFill>
+                  <a:srgbClr val="000000"/>
+                </a:solidFill>
+                <a:round/>
+                <a:headEnd/>
+                <a:tailEnd/>
+              </a14:hiddenLine>
+            </a:ext>
+          </a:extLst>
+        </p:spPr>
+        <p:style>
+          <a:lnRef idx="1">
+            <a:schemeClr val="accent1"/>
+          </a:lnRef>
+          <a:fillRef idx="3">
+            <a:schemeClr val="accent1"/>
+          </a:fillRef>
+          <a:effectRef idx="2">
+            <a:schemeClr val="accent1"/>
+          </a:effectRef>
+          <a:fontRef idx="minor">
+            <a:schemeClr val="lt1"/>
+          </a:fontRef>
+        </p:style>
+      </p:sp>
+      <p:sp>
+        <p:nvSpPr>
+          <p:cNvPr id="25" name="Rectangle 12">
+            <a:extLst>
+              <a:ext uri="{FF2B5EF4-FFF2-40B4-BE49-F238E27FC236}">
+                <a16:creationId xmlns:a16="http://schemas.microsoft.com/office/drawing/2014/main" id="{8C1FC8BA-94E6-44F7-B346-6A2215E66D2E}"/>
+              </a:ext>
+              <a:ext uri="{C183D7F6-B498-43B3-948B-1728B52AA6E4}">
+                <adec:decorative xmlns:adec="http://schemas.microsoft.com/office/drawing/2017/decorative" val="1"/>
+              </a:ext>
+            </a:extLst>
+          </p:cNvPr>
+          <p:cNvSpPr>
+            <a:spLocks noGrp="1" noRot="1" noChangeAspect="1" noMove="1" noResize="1" noEditPoints="1" noAdjustHandles="1" noChangeArrowheads="1" noChangeShapeType="1" noTextEdit="1"/>
+          </p:cNvSpPr>
+          <p:nvPr>
+            <p:extLst>
+              <p:ext uri="{386F3935-93C4-4BCD-93E2-E3B085C9AB24}">
+                <p16:designElem xmlns:p16="http://schemas.microsoft.com/office/powerpoint/2015/main" val="1"/>
+              </p:ext>
+            </p:extLst>
+          </p:nvPr>
+        </p:nvSpPr>
+        <p:spPr>
+          <a:xfrm>
+            <a:off x="0" y="0"/>
+            <a:ext cx="12188952" cy="6858000"/>
+          </a:xfrm>
+          <a:prstGeom prst="rect">
+            <a:avLst/>
+          </a:prstGeom>
+          <a:solidFill>
+            <a:schemeClr val="bg1"/>
+          </a:solidFill>
+          <a:ln>
+            <a:noFill/>
+          </a:ln>
+        </p:spPr>
+        <p:style>
+          <a:lnRef idx="2">
+            <a:schemeClr val="accent1">
+              <a:shade val="50000"/>
+            </a:schemeClr>
+          </a:lnRef>
+          <a:fillRef idx="1">
+            <a:schemeClr val="accent1"/>
+          </a:fillRef>
+          <a:effectRef idx="0">
+            <a:schemeClr val="accent1"/>
+          </a:effectRef>
+          <a:fontRef idx="minor">
+            <a:schemeClr val="lt1"/>
+          </a:fontRef>
+        </p:style>
+        <p:txBody>
+          <a:bodyPr rtlCol="0" anchor="ctr"/>
+          <a:lstStyle/>
+          <a:p>
+            <a:pPr algn="ctr"/>
+            <a:endParaRPr lang="en-US"/>
+          </a:p>
+        </p:txBody>
+      </p:sp>
+      <p:sp>
+        <p:nvSpPr>
+          <p:cNvPr id="26" name="Freeform 23">
+            <a:extLst>
+              <a:ext uri="{FF2B5EF4-FFF2-40B4-BE49-F238E27FC236}">
+                <a16:creationId xmlns:a16="http://schemas.microsoft.com/office/drawing/2014/main" id="{A8329D92-4903-43FF-90F4-878F5D3F1D22}"/>
+              </a:ext>
+              <a:ext uri="{C183D7F6-B498-43B3-948B-1728B52AA6E4}">
+                <adec:decorative xmlns:adec="http://schemas.microsoft.com/office/drawing/2017/decorative" val="1"/>
+              </a:ext>
+            </a:extLst>
+          </p:cNvPr>
+          <p:cNvSpPr>
+            <a:spLocks noGrp="1" noRot="1" noChangeAspect="1" noMove="1" noResize="1" noEditPoints="1" noAdjustHandles="1" noChangeArrowheads="1" noChangeShapeType="1" noTextEdit="1"/>
+          </p:cNvSpPr>
+          <p:nvPr>
+            <p:extLst>
+              <p:ext uri="{386F3935-93C4-4BCD-93E2-E3B085C9AB24}">
+                <p16:designElem xmlns:p16="http://schemas.microsoft.com/office/powerpoint/2015/main" val="1"/>
+              </p:ext>
+            </p:extLst>
+          </p:nvPr>
+        </p:nvSpPr>
+        <p:spPr bwMode="white">
+          <a:xfrm>
+            <a:off x="0" y="0"/>
+            <a:ext cx="4637005" cy="6858000"/>
+          </a:xfrm>
+          <a:custGeom>
+            <a:avLst/>
+            <a:gdLst>
+              <a:gd name="connsiteX0" fmla="*/ 0 w 4637005"/>
+              <a:gd name="connsiteY0" fmla="*/ 0 h 6858000"/>
+              <a:gd name="connsiteX1" fmla="*/ 4637005 w 4637005"/>
+              <a:gd name="connsiteY1" fmla="*/ 0 h 6858000"/>
+              <a:gd name="connsiteX2" fmla="*/ 4637005 w 4637005"/>
+              <a:gd name="connsiteY2" fmla="*/ 1900238 h 6858000"/>
+              <a:gd name="connsiteX3" fmla="*/ 4266589 w 4637005"/>
+              <a:gd name="connsiteY3" fmla="*/ 2178050 h 6858000"/>
+              <a:gd name="connsiteX4" fmla="*/ 4262355 w 4637005"/>
+              <a:gd name="connsiteY4" fmla="*/ 2184400 h 6858000"/>
+              <a:gd name="connsiteX5" fmla="*/ 4256005 w 4637005"/>
+              <a:gd name="connsiteY5" fmla="*/ 2193925 h 6858000"/>
+              <a:gd name="connsiteX6" fmla="*/ 4249655 w 4637005"/>
+              <a:gd name="connsiteY6" fmla="*/ 2201863 h 6858000"/>
+              <a:gd name="connsiteX7" fmla="*/ 4249655 w 4637005"/>
+              <a:gd name="connsiteY7" fmla="*/ 2211388 h 6858000"/>
+              <a:gd name="connsiteX8" fmla="*/ 4249655 w 4637005"/>
+              <a:gd name="connsiteY8" fmla="*/ 2220913 h 6858000"/>
+              <a:gd name="connsiteX9" fmla="*/ 4256005 w 4637005"/>
+              <a:gd name="connsiteY9" fmla="*/ 2228850 h 6858000"/>
+              <a:gd name="connsiteX10" fmla="*/ 4262355 w 4637005"/>
+              <a:gd name="connsiteY10" fmla="*/ 2238375 h 6858000"/>
+              <a:gd name="connsiteX11" fmla="*/ 4266589 w 4637005"/>
+              <a:gd name="connsiteY11" fmla="*/ 2244725 h 6858000"/>
+              <a:gd name="connsiteX12" fmla="*/ 4637005 w 4637005"/>
+              <a:gd name="connsiteY12" fmla="*/ 2522538 h 6858000"/>
+              <a:gd name="connsiteX13" fmla="*/ 4637005 w 4637005"/>
+              <a:gd name="connsiteY13" fmla="*/ 6858000 h 6858000"/>
+              <a:gd name="connsiteX14" fmla="*/ 0 w 4637005"/>
+              <a:gd name="connsiteY14" fmla="*/ 6858000 h 6858000"/>
+            </a:gdLst>
+            <a:ahLst/>
+            <a:cxnLst>
+              <a:cxn ang="0">
+                <a:pos x="connsiteX0" y="connsiteY0"/>
+              </a:cxn>
+              <a:cxn ang="0">
+                <a:pos x="connsiteX1" y="connsiteY1"/>
+              </a:cxn>
+              <a:cxn ang="0">
+                <a:pos x="connsiteX2" y="connsiteY2"/>
+              </a:cxn>
+              <a:cxn ang="0">
+                <a:pos x="connsiteX3" y="connsiteY3"/>
+              </a:cxn>
+              <a:cxn ang="0">
+                <a:pos x="connsiteX4" y="connsiteY4"/>
+              </a:cxn>
+              <a:cxn ang="0">
+                <a:pos x="connsiteX5" y="connsiteY5"/>
+              </a:cxn>
+              <a:cxn ang="0">
+                <a:pos x="connsiteX6" y="connsiteY6"/>
+              </a:cxn>
+              <a:cxn ang="0">
+                <a:pos x="connsiteX7" y="connsiteY7"/>
+              </a:cxn>
+              <a:cxn ang="0">
+                <a:pos x="connsiteX8" y="connsiteY8"/>
+              </a:cxn>
+              <a:cxn ang="0">
+                <a:pos x="connsiteX9" y="connsiteY9"/>
+              </a:cxn>
+              <a:cxn ang="0">
+                <a:pos x="connsiteX10" y="connsiteY10"/>
+              </a:cxn>
+              <a:cxn ang="0">
+                <a:pos x="connsiteX11" y="connsiteY11"/>
+              </a:cxn>
+              <a:cxn ang="0">
+                <a:pos x="connsiteX12" y="connsiteY12"/>
+              </a:cxn>
+              <a:cxn ang="0">
+                <a:pos x="connsiteX13" y="connsiteY13"/>
+              </a:cxn>
+              <a:cxn ang="0">
+                <a:pos x="connsiteX14" y="connsiteY14"/>
+              </a:cxn>
+            </a:cxnLst>
+            <a:rect l="l" t="t" r="r" b="b"/>
+            <a:pathLst>
+              <a:path w="4637005" h="6858000">
+                <a:moveTo>
+                  <a:pt x="0" y="0"/>
+                </a:moveTo>
+                <a:lnTo>
+                  <a:pt x="4637005" y="0"/>
+                </a:lnTo>
+                <a:lnTo>
+                  <a:pt x="4637005" y="1900238"/>
+                </a:lnTo>
+                <a:lnTo>
+                  <a:pt x="4266589" y="2178050"/>
+                </a:lnTo>
+                <a:lnTo>
+                  <a:pt x="4262355" y="2184400"/>
+                </a:lnTo>
+                <a:lnTo>
+                  <a:pt x="4256005" y="2193925"/>
+                </a:lnTo>
+                <a:lnTo>
+                  <a:pt x="4249655" y="2201863"/>
+                </a:lnTo>
+                <a:lnTo>
+                  <a:pt x="4249655" y="2211388"/>
+                </a:lnTo>
+                <a:lnTo>
+                  <a:pt x="4249655" y="2220913"/>
+                </a:lnTo>
+                <a:lnTo>
+                  <a:pt x="4256005" y="2228850"/>
+                </a:lnTo>
+                <a:lnTo>
+                  <a:pt x="4262355" y="2238375"/>
+                </a:lnTo>
+                <a:lnTo>
+                  <a:pt x="4266589" y="2244725"/>
+                </a:lnTo>
+                <a:lnTo>
+                  <a:pt x="4637005" y="2522538"/>
+                </a:lnTo>
+                <a:lnTo>
+                  <a:pt x="4637005" y="6858000"/>
+                </a:lnTo>
+                <a:lnTo>
+                  <a:pt x="0" y="6858000"/>
+                </a:lnTo>
+                <a:close/>
+              </a:path>
+            </a:pathLst>
+          </a:custGeom>
+          <a:solidFill>
+            <a:srgbClr val="262626"/>
+          </a:solidFill>
+          <a:ln>
+            <a:noFill/>
+          </a:ln>
+        </p:spPr>
+        <p:style>
+          <a:lnRef idx="2">
+            <a:schemeClr val="accent1">
+              <a:shade val="50000"/>
+            </a:schemeClr>
+          </a:lnRef>
+          <a:fillRef idx="1">
+            <a:schemeClr val="accent1"/>
+          </a:fillRef>
+          <a:effectRef idx="0">
+            <a:schemeClr val="accent1"/>
+          </a:effectRef>
+          <a:fontRef idx="minor">
+            <a:schemeClr val="lt1"/>
+          </a:fontRef>
+        </p:style>
+        <p:txBody>
+          <a:bodyPr wrap="square" rtlCol="0" anchor="ctr">
+            <a:noAutofit/>
+          </a:bodyPr>
+          <a:lstStyle/>
+          <a:p>
+            <a:pPr algn="ctr"/>
+            <a:endParaRPr lang="en-US"/>
+          </a:p>
+        </p:txBody>
+      </p:sp>
+      <p:sp>
+        <p:nvSpPr>
+          <p:cNvPr id="2" name="Title 1">
+            <a:extLst>
+              <a:ext uri="{FF2B5EF4-FFF2-40B4-BE49-F238E27FC236}">
+                <a16:creationId xmlns:a16="http://schemas.microsoft.com/office/drawing/2014/main" id="{84574A78-8DD4-4A4A-8CEA-AC048042931B}"/>
+              </a:ext>
+            </a:extLst>
+          </p:cNvPr>
+          <p:cNvSpPr>
+            <a:spLocks noGrp="1"/>
+          </p:cNvSpPr>
+          <p:nvPr>
+            <p:ph type="title"/>
+          </p:nvPr>
+        </p:nvSpPr>
+        <p:spPr>
+          <a:xfrm>
+            <a:off x="810001" y="447188"/>
+            <a:ext cx="3413084" cy="1559412"/>
+          </a:xfrm>
+        </p:spPr>
+        <p:txBody>
+          <a:bodyPr vert="horz" lIns="91440" tIns="45720" rIns="91440" bIns="45720" rtlCol="0" anchor="b">
+            <a:normAutofit/>
+          </a:bodyPr>
+          <a:lstStyle/>
+          <a:p>
+            <a:r>
+              <a:rPr lang="en-US" sz="3200"/>
+              <a:t>1.1 utilisation de la bibliothèque ncurse:</a:t>
+            </a:r>
+          </a:p>
+        </p:txBody>
+      </p:sp>
+      <p:sp>
+        <p:nvSpPr>
+          <p:cNvPr id="3" name="Content Placeholder 2">
+            <a:extLst>
+              <a:ext uri="{FF2B5EF4-FFF2-40B4-BE49-F238E27FC236}">
+                <a16:creationId xmlns:a16="http://schemas.microsoft.com/office/drawing/2014/main" id="{6B79532C-9214-9C42-8BFF-F42C717DF159}"/>
+              </a:ext>
+            </a:extLst>
+          </p:cNvPr>
+          <p:cNvSpPr>
+            <a:spLocks noGrp="1"/>
+          </p:cNvSpPr>
+          <p:nvPr>
+            <p:ph sz="half" idx="1"/>
+          </p:nvPr>
+        </p:nvSpPr>
+        <p:spPr>
+          <a:xfrm>
+            <a:off x="818713" y="2413000"/>
+            <a:ext cx="3404372" cy="3632200"/>
+          </a:xfrm>
+        </p:spPr>
+        <p:txBody>
+          <a:bodyPr vert="horz" lIns="91440" tIns="45720" rIns="91440" bIns="45720" rtlCol="0" anchor="ctr">
+            <a:normAutofit/>
+          </a:bodyPr>
+          <a:lstStyle/>
+          <a:p>
+            <a:r>
+              <a:rPr lang="en-US" sz="1600">
+                <a:solidFill>
+                  <a:srgbClr val="FFFFFF"/>
+                </a:solidFill>
+              </a:rPr>
+              <a:t>Couleur jaune globale du plateau de jeu et le score.</a:t>
+            </a:r>
+          </a:p>
+          <a:p>
+            <a:r>
+              <a:rPr lang="en-US" sz="1600">
+                <a:solidFill>
+                  <a:srgbClr val="FFFFFF"/>
+                </a:solidFill>
+              </a:rPr>
+              <a:t>Couleur blanche sur fond rouge pour le texte de fin de jeu</a:t>
+            </a:r>
+          </a:p>
+          <a:p>
+            <a:r>
+              <a:rPr lang="en-US" sz="1600">
+                <a:solidFill>
+                  <a:srgbClr val="FFFFFF"/>
+                </a:solidFill>
+              </a:rPr>
+              <a:t>Couleur noir sur fond blanc pour le score de fin de partie</a:t>
+            </a:r>
+          </a:p>
+        </p:txBody>
+      </p:sp>
+      <p:sp>
+        <p:nvSpPr>
+          <p:cNvPr id="17" name="Rounded Rectangle 17">
+            <a:extLst>
+              <a:ext uri="{FF2B5EF4-FFF2-40B4-BE49-F238E27FC236}">
+                <a16:creationId xmlns:a16="http://schemas.microsoft.com/office/drawing/2014/main" id="{567B1EEF-AB32-40F7-AD5F-41E0EA001EBE}"/>
+              </a:ext>
+              <a:ext uri="{C183D7F6-B498-43B3-948B-1728B52AA6E4}">
+                <adec:decorative xmlns:adec="http://schemas.microsoft.com/office/drawing/2017/decorative" val="1"/>
+              </a:ext>
+            </a:extLst>
+          </p:cNvPr>
+          <p:cNvSpPr>
+            <a:spLocks noGrp="1" noRot="1" noChangeAspect="1" noMove="1" noResize="1" noEditPoints="1" noAdjustHandles="1" noChangeArrowheads="1" noChangeShapeType="1" noTextEdit="1"/>
+          </p:cNvSpPr>
+          <p:nvPr>
+            <p:extLst>
+              <p:ext uri="{386F3935-93C4-4BCD-93E2-E3B085C9AB24}">
+                <p16:designElem xmlns:p16="http://schemas.microsoft.com/office/powerpoint/2015/main" val="1"/>
+              </p:ext>
+            </p:extLst>
+          </p:nvPr>
+        </p:nvSpPr>
+        <p:spPr>
+          <a:xfrm>
+            <a:off x="5278945" y="958640"/>
+            <a:ext cx="6269591" cy="4945244"/>
+          </a:xfrm>
+          <a:prstGeom prst="roundRect">
+            <a:avLst>
+              <a:gd name="adj" fmla="val 3513"/>
+            </a:avLst>
+          </a:prstGeom>
+          <a:solidFill>
+            <a:schemeClr val="bg1"/>
+          </a:solidFill>
+          <a:ln>
+            <a:solidFill>
+              <a:schemeClr val="accent1"/>
+            </a:solidFill>
+          </a:ln>
+          <a:effectLst/>
+        </p:spPr>
+        <p:style>
+          <a:lnRef idx="2">
+            <a:schemeClr val="accent1">
+              <a:shade val="50000"/>
+            </a:schemeClr>
+          </a:lnRef>
+          <a:fillRef idx="1">
+            <a:schemeClr val="accent1"/>
+          </a:fillRef>
+          <a:effectRef idx="0">
+            <a:schemeClr val="accent1"/>
+          </a:effectRef>
+          <a:fontRef idx="minor">
+            <a:schemeClr val="lt1"/>
+          </a:fontRef>
+        </p:style>
+        <p:txBody>
+          <a:bodyPr rtlCol="0" anchor="ctr"/>
+          <a:lstStyle/>
+          <a:p>
+            <a:pPr algn="ctr"/>
+            <a:endParaRPr lang="en-US"/>
+          </a:p>
+        </p:txBody>
+      </p:sp>
+      <p:pic>
+        <p:nvPicPr>
+          <p:cNvPr id="6" name="Content Placeholder 5">
+            <a:extLst>
+              <a:ext uri="{FF2B5EF4-FFF2-40B4-BE49-F238E27FC236}">
+                <a16:creationId xmlns:a16="http://schemas.microsoft.com/office/drawing/2014/main" id="{AEDCD27C-561A-FA41-9B76-33188141C53F}"/>
+              </a:ext>
+            </a:extLst>
+          </p:cNvPr>
+          <p:cNvPicPr>
+            <a:picLocks noGrp="1" noChangeAspect="1"/>
+          </p:cNvPicPr>
+          <p:nvPr>
+            <p:ph sz="half" idx="2"/>
+          </p:nvPr>
+        </p:nvPicPr>
+        <p:blipFill>
+          <a:blip r:embed="rId2"/>
+          <a:stretch>
+            <a:fillRect/>
+          </a:stretch>
+        </p:blipFill>
+        <p:spPr>
+          <a:xfrm>
+            <a:off x="6349605" y="1258529"/>
+            <a:ext cx="4147054" cy="4330205"/>
+          </a:xfrm>
+          <a:prstGeom prst="rect">
+            <a:avLst/>
+          </a:prstGeom>
+        </p:spPr>
+      </p:pic>
+    </p:spTree>
+    <p:extLst>
+      <p:ext uri="{BB962C8B-B14F-4D97-AF65-F5344CB8AC3E}">
+        <p14:creationId xmlns:p14="http://schemas.microsoft.com/office/powerpoint/2010/main" val="3528297022"/>
+      </p:ext>
+    </p:extLst>
+  </p:cSld>
+  <p:clrMapOvr>
+    <a:overrideClrMapping bg1="lt1" tx1="dk1" bg2="lt2" tx2="dk2" accent1="accent1" accent2="accent2" accent3="accent3" accent4="accent4" accent5="accent5" accent6="accent6" hlink="hlink" folHlink="folHlink"/>
+  </p:clrMapOvr>
+</p:sld>
+</file>
+
+<file path=ppt/slides/slide7.xml><?xml version="1.0" encoding="utf-8"?>
+<p:sld xmlns:a="http://schemas.openxmlformats.org/drawingml/2006/main" xmlns:r="http://schemas.openxmlformats.org/officeDocument/2006/relationships" xmlns:p="http://schemas.openxmlformats.org/presentationml/2006/main">
+  <p:cSld>
+    <p:bg>
+      <p:bgPr>
+        <a:solidFill>
+          <a:schemeClr val="bg2"/>
+        </a:solidFill>
+        <a:effectLst/>
+      </p:bgPr>
+    </p:bg>
+    <p:spTree>
+      <p:nvGrpSpPr>
+        <p:cNvPr id="1" name=""/>
+        <p:cNvGrpSpPr/>
+        <p:nvPr/>
+      </p:nvGrpSpPr>
+      <p:grpSpPr>
+        <a:xfrm>
+          <a:off x="0" y="0"/>
+          <a:ext cx="0" cy="0"/>
+          <a:chOff x="0" y="0"/>
+          <a:chExt cx="0" cy="0"/>
+        </a:xfrm>
+      </p:grpSpPr>
+      <p:sp>
+        <p:nvSpPr>
+          <p:cNvPr id="8" name="Freeform 6">
+            <a:extLst>
+              <a:ext uri="{FF2B5EF4-FFF2-40B4-BE49-F238E27FC236}">
+                <a16:creationId xmlns:a16="http://schemas.microsoft.com/office/drawing/2014/main" id="{8EE457FF-670E-4EC1-ACD4-1173DA9A7975}"/>
+              </a:ext>
+              <a:ext uri="{C183D7F6-B498-43B3-948B-1728B52AA6E4}">
+                <adec:decorative xmlns:adec="http://schemas.microsoft.com/office/drawing/2017/decorative" val="1"/>
+              </a:ext>
+            </a:extLst>
+          </p:cNvPr>
+          <p:cNvSpPr>
+            <a:spLocks noGrp="1" noRot="1" noChangeAspect="1" noMove="1" noResize="1" noEditPoints="1" noAdjustHandles="1" noChangeArrowheads="1" noChangeShapeType="1" noTextEdit="1"/>
+          </p:cNvSpPr>
+          <p:nvPr>
+            <p:extLst>
+              <p:ext uri="{386F3935-93C4-4BCD-93E2-E3B085C9AB24}">
+                <p16:designElem xmlns:p16="http://schemas.microsoft.com/office/powerpoint/2015/main" val="1"/>
+              </p:ext>
+            </p:extLst>
+          </p:nvPr>
+        </p:nvSpPr>
+        <p:spPr bwMode="auto">
+          <a:xfrm>
+            <a:off x="0" y="0"/>
+            <a:ext cx="12192000" cy="2185988"/>
+          </a:xfrm>
+          <a:custGeom>
+            <a:avLst/>
+            <a:gdLst/>
+            <a:ahLst/>
+            <a:cxnLst/>
+            <a:rect l="0" t="0" r="r" b="b"/>
+            <a:pathLst>
+              <a:path w="5760" h="1377">
+                <a:moveTo>
+                  <a:pt x="5760" y="0"/>
+                </a:moveTo>
+                <a:lnTo>
+                  <a:pt x="0" y="0"/>
+                </a:lnTo>
+                <a:lnTo>
+                  <a:pt x="0" y="1189"/>
+                </a:lnTo>
+                <a:lnTo>
+                  <a:pt x="943" y="1189"/>
+                </a:lnTo>
+                <a:lnTo>
+                  <a:pt x="1123" y="1369"/>
+                </a:lnTo>
+                <a:lnTo>
+                  <a:pt x="1123" y="1369"/>
+                </a:lnTo>
+                <a:lnTo>
+                  <a:pt x="1127" y="1371"/>
+                </a:lnTo>
+                <a:lnTo>
+                  <a:pt x="1133" y="1374"/>
+                </a:lnTo>
+                <a:lnTo>
+                  <a:pt x="1139" y="1377"/>
+                </a:lnTo>
+                <a:lnTo>
+                  <a:pt x="1144" y="1377"/>
+                </a:lnTo>
+                <a:lnTo>
+                  <a:pt x="1150" y="1377"/>
+                </a:lnTo>
+                <a:lnTo>
+                  <a:pt x="1155" y="1374"/>
+                </a:lnTo>
+                <a:lnTo>
+                  <a:pt x="1161" y="1371"/>
+                </a:lnTo>
+                <a:lnTo>
+                  <a:pt x="1165" y="1369"/>
+                </a:lnTo>
+                <a:lnTo>
+                  <a:pt x="1345" y="1189"/>
+                </a:lnTo>
+                <a:lnTo>
+                  <a:pt x="5760" y="1189"/>
+                </a:lnTo>
+                <a:lnTo>
+                  <a:pt x="5760" y="0"/>
+                </a:lnTo>
+                <a:close/>
+              </a:path>
+            </a:pathLst>
+          </a:custGeom>
+          <a:ln/>
+          <a:extLst>
+            <a:ext uri="{91240B29-F687-4f45-9708-019B960494DF}">
+              <a14:hiddenLine xmlns="" xmlns:a14="http://schemas.microsoft.com/office/drawing/2010/main" xmlns:a16="http://schemas.microsoft.com/office/drawing/2014/main" w="9525">
+                <a:solidFill>
+                  <a:srgbClr val="000000"/>
+                </a:solidFill>
+                <a:round/>
+                <a:headEnd/>
+                <a:tailEnd/>
+              </a14:hiddenLine>
+            </a:ext>
+          </a:extLst>
+        </p:spPr>
+        <p:style>
+          <a:lnRef idx="1">
+            <a:schemeClr val="accent1"/>
+          </a:lnRef>
+          <a:fillRef idx="3">
+            <a:schemeClr val="accent1"/>
+          </a:fillRef>
+          <a:effectRef idx="2">
+            <a:schemeClr val="accent1"/>
+          </a:effectRef>
+          <a:fontRef idx="minor">
+            <a:schemeClr val="lt1"/>
+          </a:fontRef>
+        </p:style>
+      </p:sp>
+      <p:sp useBgFill="1">
+        <p:nvSpPr>
+          <p:cNvPr id="10" name="Rectangle 9">
+            <a:extLst>
+              <a:ext uri="{FF2B5EF4-FFF2-40B4-BE49-F238E27FC236}">
+                <a16:creationId xmlns:a16="http://schemas.microsoft.com/office/drawing/2014/main" id="{089A69AF-D57B-49B4-886C-D4A5DC194421}"/>
+              </a:ext>
+              <a:ext uri="{C183D7F6-B498-43B3-948B-1728B52AA6E4}">
+                <adec:decorative xmlns:adec="http://schemas.microsoft.com/office/drawing/2017/decorative" val="1"/>
+              </a:ext>
+            </a:extLst>
+          </p:cNvPr>
+          <p:cNvSpPr>
+            <a:spLocks noGrp="1" noRot="1" noChangeAspect="1" noMove="1" noResize="1" noEditPoints="1" noAdjustHandles="1" noChangeArrowheads="1" noChangeShapeType="1" noTextEdit="1"/>
+          </p:cNvSpPr>
+          <p:nvPr>
+            <p:extLst>
+              <p:ext uri="{386F3935-93C4-4BCD-93E2-E3B085C9AB24}">
+                <p16:designElem xmlns:p16="http://schemas.microsoft.com/office/powerpoint/2015/main" val="1"/>
+              </p:ext>
+            </p:extLst>
+          </p:nvPr>
+        </p:nvSpPr>
+        <p:spPr>
+          <a:xfrm>
+            <a:off x="0" y="0"/>
+            <a:ext cx="12192000" cy="6858000"/>
+          </a:xfrm>
+          <a:prstGeom prst="rect">
+            <a:avLst/>
+          </a:prstGeom>
+          <a:ln>
+            <a:noFill/>
+          </a:ln>
+        </p:spPr>
+        <p:style>
+          <a:lnRef idx="2">
+            <a:schemeClr val="accent1">
+              <a:shade val="50000"/>
+            </a:schemeClr>
+          </a:lnRef>
+          <a:fillRef idx="1">
+            <a:schemeClr val="accent1"/>
+          </a:fillRef>
+          <a:effectRef idx="0">
+            <a:schemeClr val="accent1"/>
+          </a:effectRef>
+          <a:fontRef idx="minor">
+            <a:schemeClr val="lt1"/>
+          </a:fontRef>
+        </p:style>
+        <p:txBody>
+          <a:bodyPr rtlCol="0" anchor="ctr"/>
+          <a:lstStyle/>
+          <a:p>
+            <a:pPr algn="ctr"/>
+            <a:endParaRPr lang="en-US"/>
+          </a:p>
+        </p:txBody>
+      </p:sp>
+      <p:sp>
+        <p:nvSpPr>
+          <p:cNvPr id="12" name="Freeform: Shape 11">
+            <a:extLst>
+              <a:ext uri="{FF2B5EF4-FFF2-40B4-BE49-F238E27FC236}">
+                <a16:creationId xmlns:a16="http://schemas.microsoft.com/office/drawing/2014/main" id="{CABDC08D-6093-4397-92D4-54D00E2BB1C2}"/>
+              </a:ext>
+              <a:ext uri="{C183D7F6-B498-43B3-948B-1728B52AA6E4}">
+                <adec:decorative xmlns:adec="http://schemas.microsoft.com/office/drawing/2017/decorative" val="1"/>
+              </a:ext>
+            </a:extLst>
+          </p:cNvPr>
+          <p:cNvSpPr>
+            <a:spLocks noGrp="1" noRot="1" noChangeAspect="1" noMove="1" noResize="1" noEditPoints="1" noAdjustHandles="1" noChangeArrowheads="1" noChangeShapeType="1" noTextEdit="1"/>
+          </p:cNvSpPr>
+          <p:nvPr>
+            <p:extLst>
+              <p:ext uri="{386F3935-93C4-4BCD-93E2-E3B085C9AB24}">
+                <p16:designElem xmlns:p16="http://schemas.microsoft.com/office/powerpoint/2015/main" val="1"/>
+              </p:ext>
+            </p:extLst>
+          </p:nvPr>
+        </p:nvSpPr>
+        <p:spPr bwMode="auto">
+          <a:xfrm rot="16200000">
+            <a:off x="-650724" y="650724"/>
+            <a:ext cx="6858000" cy="5556552"/>
+          </a:xfrm>
+          <a:custGeom>
+            <a:avLst/>
+            <a:gdLst>
+              <a:gd name="connsiteX0" fmla="*/ 6858000 w 6858000"/>
+              <a:gd name="connsiteY0" fmla="*/ 3445704 h 5556552"/>
+              <a:gd name="connsiteX1" fmla="*/ 3829242 w 6858000"/>
+              <a:gd name="connsiteY1" fmla="*/ 5433322 h 5556552"/>
+              <a:gd name="connsiteX2" fmla="*/ 3827369 w 6858000"/>
+              <a:gd name="connsiteY2" fmla="*/ 5434867 h 5556552"/>
+              <a:gd name="connsiteX3" fmla="*/ 3824583 w 6858000"/>
+              <a:gd name="connsiteY3" fmla="*/ 5436378 h 5556552"/>
+              <a:gd name="connsiteX4" fmla="*/ 3798693 w 6858000"/>
+              <a:gd name="connsiteY4" fmla="*/ 5453370 h 5556552"/>
+              <a:gd name="connsiteX5" fmla="*/ 3785011 w 6858000"/>
+              <a:gd name="connsiteY5" fmla="*/ 5457858 h 5556552"/>
+              <a:gd name="connsiteX6" fmla="*/ 3706339 w 6858000"/>
+              <a:gd name="connsiteY6" fmla="*/ 5500559 h 5556552"/>
+              <a:gd name="connsiteX7" fmla="*/ 3428998 w 6858000"/>
+              <a:gd name="connsiteY7" fmla="*/ 5556552 h 5556552"/>
+              <a:gd name="connsiteX8" fmla="*/ 3151658 w 6858000"/>
+              <a:gd name="connsiteY8" fmla="*/ 5500559 h 5556552"/>
+              <a:gd name="connsiteX9" fmla="*/ 3072996 w 6858000"/>
+              <a:gd name="connsiteY9" fmla="*/ 5457863 h 5556552"/>
+              <a:gd name="connsiteX10" fmla="*/ 3059298 w 6858000"/>
+              <a:gd name="connsiteY10" fmla="*/ 5453370 h 5556552"/>
+              <a:gd name="connsiteX11" fmla="*/ 3033383 w 6858000"/>
+              <a:gd name="connsiteY11" fmla="*/ 5436362 h 5556552"/>
+              <a:gd name="connsiteX12" fmla="*/ 3030627 w 6858000"/>
+              <a:gd name="connsiteY12" fmla="*/ 5434867 h 5556552"/>
+              <a:gd name="connsiteX13" fmla="*/ 3028775 w 6858000"/>
+              <a:gd name="connsiteY13" fmla="*/ 5433338 h 5556552"/>
+              <a:gd name="connsiteX14" fmla="*/ 0 w 6858000"/>
+              <a:gd name="connsiteY14" fmla="*/ 3445704 h 5556552"/>
+              <a:gd name="connsiteX15" fmla="*/ 6858000 w 6858000"/>
+              <a:gd name="connsiteY15" fmla="*/ 0 h 5556552"/>
+              <a:gd name="connsiteX16" fmla="*/ 6858000 w 6858000"/>
+              <a:gd name="connsiteY16" fmla="*/ 349336 h 5556552"/>
+              <a:gd name="connsiteX17" fmla="*/ 6858000 w 6858000"/>
+              <a:gd name="connsiteY17" fmla="*/ 3445703 h 5556552"/>
+              <a:gd name="connsiteX18" fmla="*/ 0 w 6858000"/>
+              <a:gd name="connsiteY18" fmla="*/ 3445703 h 5556552"/>
+              <a:gd name="connsiteX19" fmla="*/ 0 w 6858000"/>
+              <a:gd name="connsiteY19" fmla="*/ 0 h 5556552"/>
+            </a:gdLst>
+            <a:ahLst/>
+            <a:cxnLst>
+              <a:cxn ang="0">
+                <a:pos x="connsiteX0" y="connsiteY0"/>
+              </a:cxn>
+              <a:cxn ang="0">
+                <a:pos x="connsiteX1" y="connsiteY1"/>
+              </a:cxn>
+              <a:cxn ang="0">
+                <a:pos x="connsiteX2" y="connsiteY2"/>
+              </a:cxn>
+              <a:cxn ang="0">
+                <a:pos x="connsiteX3" y="connsiteY3"/>
+              </a:cxn>
+              <a:cxn ang="0">
+                <a:pos x="connsiteX4" y="connsiteY4"/>
+              </a:cxn>
+              <a:cxn ang="0">
+                <a:pos x="connsiteX5" y="connsiteY5"/>
+              </a:cxn>
+              <a:cxn ang="0">
+                <a:pos x="connsiteX6" y="connsiteY6"/>
+              </a:cxn>
+              <a:cxn ang="0">
+                <a:pos x="connsiteX7" y="connsiteY7"/>
+              </a:cxn>
+              <a:cxn ang="0">
+                <a:pos x="connsiteX8" y="connsiteY8"/>
+              </a:cxn>
+              <a:cxn ang="0">
+                <a:pos x="connsiteX9" y="connsiteY9"/>
+              </a:cxn>
+              <a:cxn ang="0">
+                <a:pos x="connsiteX10" y="connsiteY10"/>
+              </a:cxn>
+              <a:cxn ang="0">
+                <a:pos x="connsiteX11" y="connsiteY11"/>
+              </a:cxn>
+              <a:cxn ang="0">
+                <a:pos x="connsiteX12" y="connsiteY12"/>
+              </a:cxn>
+              <a:cxn ang="0">
+                <a:pos x="connsiteX13" y="connsiteY13"/>
+              </a:cxn>
+              <a:cxn ang="0">
+                <a:pos x="connsiteX14" y="connsiteY14"/>
+              </a:cxn>
+              <a:cxn ang="0">
+                <a:pos x="connsiteX15" y="connsiteY15"/>
+              </a:cxn>
+              <a:cxn ang="0">
+                <a:pos x="connsiteX16" y="connsiteY16"/>
+              </a:cxn>
+              <a:cxn ang="0">
+                <a:pos x="connsiteX17" y="connsiteY17"/>
+              </a:cxn>
+              <a:cxn ang="0">
+                <a:pos x="connsiteX18" y="connsiteY18"/>
+              </a:cxn>
+              <a:cxn ang="0">
+                <a:pos x="connsiteX19" y="connsiteY19"/>
+              </a:cxn>
+            </a:cxnLst>
+            <a:rect l="l" t="t" r="r" b="b"/>
+            <a:pathLst>
+              <a:path w="6858000" h="5556552">
+                <a:moveTo>
+                  <a:pt x="6858000" y="3445704"/>
+                </a:moveTo>
+                <a:lnTo>
+                  <a:pt x="3829242" y="5433322"/>
+                </a:lnTo>
+                <a:lnTo>
+                  <a:pt x="3827369" y="5434867"/>
+                </a:lnTo>
+                <a:lnTo>
+                  <a:pt x="3824583" y="5436378"/>
+                </a:lnTo>
+                <a:lnTo>
+                  <a:pt x="3798693" y="5453370"/>
+                </a:lnTo>
+                <a:lnTo>
+                  <a:pt x="3785011" y="5457858"/>
+                </a:lnTo>
+                <a:lnTo>
+                  <a:pt x="3706339" y="5500559"/>
+                </a:lnTo>
+                <a:cubicBezTo>
+                  <a:pt x="3621096" y="5536614"/>
+                  <a:pt x="3527375" y="5556552"/>
+                  <a:pt x="3428998" y="5556552"/>
+                </a:cubicBezTo>
+                <a:cubicBezTo>
+                  <a:pt x="3330621" y="5556552"/>
+                  <a:pt x="3236901" y="5536614"/>
+                  <a:pt x="3151658" y="5500559"/>
+                </a:cubicBezTo>
+                <a:lnTo>
+                  <a:pt x="3072996" y="5457863"/>
+                </a:lnTo>
+                <a:lnTo>
+                  <a:pt x="3059298" y="5453370"/>
+                </a:lnTo>
+                <a:lnTo>
+                  <a:pt x="3033383" y="5436362"/>
+                </a:lnTo>
+                <a:lnTo>
+                  <a:pt x="3030627" y="5434867"/>
+                </a:lnTo>
+                <a:lnTo>
+                  <a:pt x="3028775" y="5433338"/>
+                </a:lnTo>
+                <a:lnTo>
+                  <a:pt x="0" y="3445704"/>
+                </a:lnTo>
+                <a:close/>
+                <a:moveTo>
+                  <a:pt x="6858000" y="0"/>
+                </a:moveTo>
+                <a:lnTo>
+                  <a:pt x="6858000" y="349336"/>
+                </a:lnTo>
+                <a:lnTo>
+                  <a:pt x="6858000" y="3445703"/>
+                </a:lnTo>
+                <a:lnTo>
+                  <a:pt x="0" y="3445703"/>
+                </a:lnTo>
+                <a:lnTo>
+                  <a:pt x="0" y="0"/>
+                </a:lnTo>
+                <a:close/>
+              </a:path>
+            </a:pathLst>
+          </a:custGeom>
+          <a:ln>
+            <a:noFill/>
+          </a:ln>
+          <a:effectLst/>
+          <a:extLst>
+            <a:ext uri="{91240B29-F687-4f45-9708-019B960494DF}">
+              <a14:hiddenLine xmlns="" xmlns:a14="http://schemas.microsoft.com/office/drawing/2010/main" xmlns:p14="http://schemas.microsoft.com/office/powerpoint/2010/main" xmlns:a16="http://schemas.microsoft.com/office/drawing/2014/main" w="9525">
+                <a:solidFill>
+                  <a:srgbClr val="000000"/>
+                </a:solidFill>
+                <a:round/>
+                <a:headEnd/>
+                <a:tailEnd/>
+              </a14:hiddenLine>
+            </a:ext>
+          </a:extLst>
+        </p:spPr>
+        <p:style>
+          <a:lnRef idx="1">
+            <a:schemeClr val="accent1"/>
+          </a:lnRef>
+          <a:fillRef idx="3">
+            <a:schemeClr val="accent1"/>
+          </a:fillRef>
+          <a:effectRef idx="2">
+            <a:schemeClr val="accent1"/>
+          </a:effectRef>
+          <a:fontRef idx="minor">
+            <a:schemeClr val="lt1"/>
+          </a:fontRef>
+        </p:style>
+      </p:sp>
+      <p:sp>
+        <p:nvSpPr>
+          <p:cNvPr id="2" name="Title 1">
+            <a:extLst>
+              <a:ext uri="{FF2B5EF4-FFF2-40B4-BE49-F238E27FC236}">
                 <a16:creationId xmlns:a16="http://schemas.microsoft.com/office/drawing/2014/main" id="{C8644A48-EAE2-C947-A588-E8E5DCB15018}"/>
               </a:ext>
             </a:extLst>
@@ -12186,7 +12647,7 @@
 </p:sld>
 </file>
 
-<file path=ppt/slides/slide7.xml><?xml version="1.0" encoding="utf-8"?>
+<file path=ppt/slides/slide8.xml><?xml version="1.0" encoding="utf-8"?>
 <p:sld xmlns:a="http://schemas.openxmlformats.org/drawingml/2006/main" xmlns:r="http://schemas.openxmlformats.org/officeDocument/2006/relationships" xmlns:p="http://schemas.openxmlformats.org/presentationml/2006/main">
   <p:cSld>
     <p:spTree>
@@ -12317,7 +12778,7 @@
 </p:sld>
 </file>
 
-<file path=ppt/slides/slide8.xml><?xml version="1.0" encoding="utf-8"?>
+<file path=ppt/slides/slide9.xml><?xml version="1.0" encoding="utf-8"?>
 <p:sld xmlns:a="http://schemas.openxmlformats.org/drawingml/2006/main" xmlns:r="http://schemas.openxmlformats.org/officeDocument/2006/relationships" xmlns:p="http://schemas.openxmlformats.org/presentationml/2006/main">
   <p:cSld>
     <p:bg>
@@ -12656,64 +13117,6 @@
     <p:extLst>
       <p:ext uri="{BB962C8B-B14F-4D97-AF65-F5344CB8AC3E}">
         <p14:creationId xmlns:p14="http://schemas.microsoft.com/office/powerpoint/2010/main" val="63337937"/>
-      </p:ext>
-    </p:extLst>
-  </p:cSld>
-  <p:clrMapOvr>
-    <a:masterClrMapping/>
-  </p:clrMapOvr>
-</p:sld>
-</file>
-
-<file path=ppt/slides/slide9.xml><?xml version="1.0" encoding="utf-8"?>
-<p:sld xmlns:a="http://schemas.openxmlformats.org/drawingml/2006/main" xmlns:r="http://schemas.openxmlformats.org/officeDocument/2006/relationships" xmlns:p="http://schemas.openxmlformats.org/presentationml/2006/main">
-  <p:cSld>
-    <p:spTree>
-      <p:nvGrpSpPr>
-        <p:cNvPr id="1" name=""/>
-        <p:cNvGrpSpPr/>
-        <p:nvPr/>
-      </p:nvGrpSpPr>
-      <p:grpSpPr>
-        <a:xfrm>
-          <a:off x="0" y="0"/>
-          <a:ext cx="0" cy="0"/>
-          <a:chOff x="0" y="0"/>
-          <a:chExt cx="0" cy="0"/>
-        </a:xfrm>
-      </p:grpSpPr>
-      <p:sp>
-        <p:nvSpPr>
-          <p:cNvPr id="2" name="Title 1">
-            <a:extLst>
-              <a:ext uri="{FF2B5EF4-FFF2-40B4-BE49-F238E27FC236}">
-                <a16:creationId xmlns:a16="http://schemas.microsoft.com/office/drawing/2014/main" id="{3335E8FC-169E-F64C-A0CB-B0A7A087A39F}"/>
-              </a:ext>
-            </a:extLst>
-          </p:cNvPr>
-          <p:cNvSpPr>
-            <a:spLocks noGrp="1"/>
-          </p:cNvSpPr>
-          <p:nvPr>
-            <p:ph type="ctrTitle"/>
-          </p:nvPr>
-        </p:nvSpPr>
-        <p:spPr/>
-        <p:txBody>
-          <a:bodyPr/>
-          <a:lstStyle/>
-          <a:p>
-            <a:r>
-              <a:rPr lang="fr-FR" dirty="0"/>
-              <a:t>Niveau 2</a:t>
-            </a:r>
-          </a:p>
-        </p:txBody>
-      </p:sp>
-    </p:spTree>
-    <p:extLst>
-      <p:ext uri="{BB962C8B-B14F-4D97-AF65-F5344CB8AC3E}">
-        <p14:creationId xmlns:p14="http://schemas.microsoft.com/office/powerpoint/2010/main" val="1705030933"/>
       </p:ext>
     </p:extLst>
   </p:cSld>

</xml_diff>